<commit_message>
95% done, maybe slight changes to last slide
</commit_message>
<xml_diff>
--- a/ds500_interim_presentation.pptx
+++ b/ds500_interim_presentation.pptx
@@ -5,17 +5,16 @@
     <p:sldMasterId id="2147483648" r:id="rId1"/>
   </p:sldMasterIdLst>
   <p:notesMasterIdLst>
-    <p:notesMasterId r:id="rId7"/>
+    <p:notesMasterId r:id="rId6"/>
   </p:notesMasterIdLst>
   <p:handoutMasterIdLst>
-    <p:handoutMasterId r:id="rId8"/>
+    <p:handoutMasterId r:id="rId7"/>
   </p:handoutMasterIdLst>
   <p:sldIdLst>
     <p:sldId id="256" r:id="rId2"/>
-    <p:sldId id="257" r:id="rId3"/>
-    <p:sldId id="258" r:id="rId4"/>
-    <p:sldId id="259" r:id="rId5"/>
-    <p:sldId id="260" r:id="rId6"/>
+    <p:sldId id="258" r:id="rId3"/>
+    <p:sldId id="259" r:id="rId4"/>
+    <p:sldId id="260" r:id="rId5"/>
   </p:sldIdLst>
   <p:sldSz cx="12192000" cy="6858000"/>
   <p:notesSz cx="6858000" cy="9144000"/>
@@ -125,7 +124,7 @@
 <file path=ppt/revisionInfo.xml><?xml version="1.0" encoding="utf-8"?>
 <p1510:revInfo xmlns:a="http://schemas.openxmlformats.org/drawingml/2006/main" xmlns:r="http://schemas.openxmlformats.org/officeDocument/2006/relationships" xmlns:p1510="http://schemas.microsoft.com/office/powerpoint/2015/10/main">
   <p1510:revLst>
-    <p1510:client id="{0A7C41DA-D18F-445E-89EC-23753386F40D}" v="7" dt="2023-12-10T19:21:05.083"/>
+    <p1510:client id="{0A7C41DA-D18F-445E-89EC-23753386F40D}" v="17" dt="2023-12-13T17:24:34.466"/>
   </p1510:revLst>
 </p1510:revInfo>
 </file>
@@ -134,19 +133,50 @@
 <pc:chgInfo xmlns:a="http://schemas.openxmlformats.org/drawingml/2006/main" xmlns:r="http://schemas.openxmlformats.org/officeDocument/2006/relationships" xmlns:ac="http://schemas.microsoft.com/office/drawing/2013/main/command" xmlns:pc="http://schemas.microsoft.com/office/powerpoint/2013/main/command">
   <pc:docChgLst>
     <pc:chgData name="Benjamin Herzberger" userId="3bec8798b78bcecb" providerId="LiveId" clId="{0A7C41DA-D18F-445E-89EC-23753386F40D}"/>
-    <pc:docChg chg="undo custSel addSld modSld">
-      <pc:chgData name="Benjamin Herzberger" userId="3bec8798b78bcecb" providerId="LiveId" clId="{0A7C41DA-D18F-445E-89EC-23753386F40D}" dt="2023-12-10T19:45:05.994" v="3261" actId="20577"/>
+    <pc:docChg chg="undo custSel addSld delSld modSld modMainMaster">
+      <pc:chgData name="Benjamin Herzberger" userId="3bec8798b78bcecb" providerId="LiveId" clId="{0A7C41DA-D18F-445E-89EC-23753386F40D}" dt="2023-12-13T17:54:23.450" v="3487" actId="20577"/>
       <pc:docMkLst>
         <pc:docMk/>
       </pc:docMkLst>
-      <pc:sldChg chg="addSp delSp modSp mod">
-        <pc:chgData name="Benjamin Herzberger" userId="3bec8798b78bcecb" providerId="LiveId" clId="{0A7C41DA-D18F-445E-89EC-23753386F40D}" dt="2023-12-10T19:26:52.633" v="2734" actId="20577"/>
+      <pc:sldChg chg="modSp mod setBg">
+        <pc:chgData name="Benjamin Herzberger" userId="3bec8798b78bcecb" providerId="LiveId" clId="{0A7C41DA-D18F-445E-89EC-23753386F40D}" dt="2023-12-13T17:24:12.026" v="3284" actId="20577"/>
+        <pc:sldMkLst>
+          <pc:docMk/>
+          <pc:sldMk cId="3317120457" sldId="256"/>
+        </pc:sldMkLst>
+        <pc:spChg chg="mod">
+          <ac:chgData name="Benjamin Herzberger" userId="3bec8798b78bcecb" providerId="LiveId" clId="{0A7C41DA-D18F-445E-89EC-23753386F40D}" dt="2023-12-13T17:22:44.504" v="3267" actId="2711"/>
+          <ac:spMkLst>
+            <pc:docMk/>
+            <pc:sldMk cId="3317120457" sldId="256"/>
+            <ac:spMk id="2" creationId="{34FD3747-4979-7B6B-B5A2-4E2E8C080C0C}"/>
+          </ac:spMkLst>
+        </pc:spChg>
+        <pc:spChg chg="mod">
+          <ac:chgData name="Benjamin Herzberger" userId="3bec8798b78bcecb" providerId="LiveId" clId="{0A7C41DA-D18F-445E-89EC-23753386F40D}" dt="2023-12-13T17:24:12.026" v="3284" actId="20577"/>
+          <ac:spMkLst>
+            <pc:docMk/>
+            <pc:sldMk cId="3317120457" sldId="256"/>
+            <ac:spMk id="3" creationId="{6C175FEE-739C-1E66-2C69-7E773775A6B8}"/>
+          </ac:spMkLst>
+        </pc:spChg>
+      </pc:sldChg>
+      <pc:sldChg chg="addSp delSp modSp del mod">
+        <pc:chgData name="Benjamin Herzberger" userId="3bec8798b78bcecb" providerId="LiveId" clId="{0A7C41DA-D18F-445E-89EC-23753386F40D}" dt="2023-12-13T17:48:02.821" v="3322" actId="2696"/>
         <pc:sldMkLst>
           <pc:docMk/>
           <pc:sldMk cId="2981172428" sldId="257"/>
         </pc:sldMkLst>
         <pc:spChg chg="mod">
-          <ac:chgData name="Benjamin Herzberger" userId="3bec8798b78bcecb" providerId="LiveId" clId="{0A7C41DA-D18F-445E-89EC-23753386F40D}" dt="2023-12-10T19:26:52.633" v="2734" actId="20577"/>
+          <ac:chgData name="Benjamin Herzberger" userId="3bec8798b78bcecb" providerId="LiveId" clId="{0A7C41DA-D18F-445E-89EC-23753386F40D}" dt="2023-12-13T17:23:15.417" v="3271" actId="2711"/>
+          <ac:spMkLst>
+            <pc:docMk/>
+            <pc:sldMk cId="2981172428" sldId="257"/>
+            <ac:spMk id="2" creationId="{4DB6D0AC-D8FF-5908-18A5-1A0FE9E7C808}"/>
+          </ac:spMkLst>
+        </pc:spChg>
+        <pc:spChg chg="mod">
+          <ac:chgData name="Benjamin Herzberger" userId="3bec8798b78bcecb" providerId="LiveId" clId="{0A7C41DA-D18F-445E-89EC-23753386F40D}" dt="2023-12-13T17:47:55.286" v="3321" actId="20577"/>
           <ac:spMkLst>
             <pc:docMk/>
             <pc:sldMk cId="2981172428" sldId="257"/>
@@ -187,13 +217,13 @@
         </pc:graphicFrameChg>
       </pc:sldChg>
       <pc:sldChg chg="modSp mod">
-        <pc:chgData name="Benjamin Herzberger" userId="3bec8798b78bcecb" providerId="LiveId" clId="{0A7C41DA-D18F-445E-89EC-23753386F40D}" dt="2023-12-10T19:25:25.774" v="2716" actId="255"/>
+        <pc:chgData name="Benjamin Herzberger" userId="3bec8798b78bcecb" providerId="LiveId" clId="{0A7C41DA-D18F-445E-89EC-23753386F40D}" dt="2023-12-13T17:51:24.499" v="3409" actId="20577"/>
         <pc:sldMkLst>
           <pc:docMk/>
           <pc:sldMk cId="1475568040" sldId="258"/>
         </pc:sldMkLst>
         <pc:spChg chg="mod">
-          <ac:chgData name="Benjamin Herzberger" userId="3bec8798b78bcecb" providerId="LiveId" clId="{0A7C41DA-D18F-445E-89EC-23753386F40D}" dt="2023-12-10T18:37:05.635" v="62" actId="20577"/>
+          <ac:chgData name="Benjamin Herzberger" userId="3bec8798b78bcecb" providerId="LiveId" clId="{0A7C41DA-D18F-445E-89EC-23753386F40D}" dt="2023-12-13T17:44:29.311" v="3303" actId="14100"/>
           <ac:spMkLst>
             <pc:docMk/>
             <pc:sldMk cId="1475568040" sldId="258"/>
@@ -201,7 +231,7 @@
           </ac:spMkLst>
         </pc:spChg>
         <pc:spChg chg="mod">
-          <ac:chgData name="Benjamin Herzberger" userId="3bec8798b78bcecb" providerId="LiveId" clId="{0A7C41DA-D18F-445E-89EC-23753386F40D}" dt="2023-12-10T19:25:25.774" v="2716" actId="255"/>
+          <ac:chgData name="Benjamin Herzberger" userId="3bec8798b78bcecb" providerId="LiveId" clId="{0A7C41DA-D18F-445E-89EC-23753386F40D}" dt="2023-12-13T17:51:24.499" v="3409" actId="20577"/>
           <ac:spMkLst>
             <pc:docMk/>
             <pc:sldMk cId="1475568040" sldId="258"/>
@@ -218,13 +248,13 @@
         </pc:spChg>
       </pc:sldChg>
       <pc:sldChg chg="modSp new mod">
-        <pc:chgData name="Benjamin Herzberger" userId="3bec8798b78bcecb" providerId="LiveId" clId="{0A7C41DA-D18F-445E-89EC-23753386F40D}" dt="2023-12-10T19:42:29.324" v="3084" actId="20577"/>
+        <pc:chgData name="Benjamin Herzberger" userId="3bec8798b78bcecb" providerId="LiveId" clId="{0A7C41DA-D18F-445E-89EC-23753386F40D}" dt="2023-12-13T17:44:54.891" v="3305" actId="1076"/>
         <pc:sldMkLst>
           <pc:docMk/>
           <pc:sldMk cId="1274610509" sldId="259"/>
         </pc:sldMkLst>
         <pc:spChg chg="mod">
-          <ac:chgData name="Benjamin Herzberger" userId="3bec8798b78bcecb" providerId="LiveId" clId="{0A7C41DA-D18F-445E-89EC-23753386F40D}" dt="2023-12-10T19:12:44.576" v="2084" actId="20577"/>
+          <ac:chgData name="Benjamin Herzberger" userId="3bec8798b78bcecb" providerId="LiveId" clId="{0A7C41DA-D18F-445E-89EC-23753386F40D}" dt="2023-12-13T17:44:54.891" v="3305" actId="1076"/>
           <ac:spMkLst>
             <pc:docMk/>
             <pc:sldMk cId="1274610509" sldId="259"/>
@@ -232,7 +262,7 @@
           </ac:spMkLst>
         </pc:spChg>
         <pc:spChg chg="mod">
-          <ac:chgData name="Benjamin Herzberger" userId="3bec8798b78bcecb" providerId="LiveId" clId="{0A7C41DA-D18F-445E-89EC-23753386F40D}" dt="2023-12-10T19:42:29.324" v="3084" actId="20577"/>
+          <ac:chgData name="Benjamin Herzberger" userId="3bec8798b78bcecb" providerId="LiveId" clId="{0A7C41DA-D18F-445E-89EC-23753386F40D}" dt="2023-12-13T17:23:39.336" v="3278" actId="27636"/>
           <ac:spMkLst>
             <pc:docMk/>
             <pc:sldMk cId="1274610509" sldId="259"/>
@@ -249,13 +279,13 @@
         </pc:spChg>
       </pc:sldChg>
       <pc:sldChg chg="modSp new mod">
-        <pc:chgData name="Benjamin Herzberger" userId="3bec8798b78bcecb" providerId="LiveId" clId="{0A7C41DA-D18F-445E-89EC-23753386F40D}" dt="2023-12-10T19:45:05.994" v="3261" actId="20577"/>
+        <pc:chgData name="Benjamin Herzberger" userId="3bec8798b78bcecb" providerId="LiveId" clId="{0A7C41DA-D18F-445E-89EC-23753386F40D}" dt="2023-12-13T17:54:23.450" v="3487" actId="20577"/>
         <pc:sldMkLst>
           <pc:docMk/>
           <pc:sldMk cId="2364694745" sldId="260"/>
         </pc:sldMkLst>
         <pc:spChg chg="mod">
-          <ac:chgData name="Benjamin Herzberger" userId="3bec8798b78bcecb" providerId="LiveId" clId="{0A7C41DA-D18F-445E-89EC-23753386F40D}" dt="2023-12-10T19:43:20.258" v="3108" actId="404"/>
+          <ac:chgData name="Benjamin Herzberger" userId="3bec8798b78bcecb" providerId="LiveId" clId="{0A7C41DA-D18F-445E-89EC-23753386F40D}" dt="2023-12-13T17:54:23.450" v="3487" actId="20577"/>
           <ac:spMkLst>
             <pc:docMk/>
             <pc:sldMk cId="2364694745" sldId="260"/>
@@ -263,7 +293,7 @@
           </ac:spMkLst>
         </pc:spChg>
         <pc:spChg chg="mod">
-          <ac:chgData name="Benjamin Herzberger" userId="3bec8798b78bcecb" providerId="LiveId" clId="{0A7C41DA-D18F-445E-89EC-23753386F40D}" dt="2023-12-10T19:45:05.994" v="3261" actId="20577"/>
+          <ac:chgData name="Benjamin Herzberger" userId="3bec8798b78bcecb" providerId="LiveId" clId="{0A7C41DA-D18F-445E-89EC-23753386F40D}" dt="2023-12-13T17:53:45.915" v="3467" actId="20577"/>
           <ac:spMkLst>
             <pc:docMk/>
             <pc:sldMk cId="2364694745" sldId="260"/>
@@ -271,6 +301,101 @@
           </ac:spMkLst>
         </pc:spChg>
       </pc:sldChg>
+      <pc:sldMasterChg chg="setBg modSldLayout">
+        <pc:chgData name="Benjamin Herzberger" userId="3bec8798b78bcecb" providerId="LiveId" clId="{0A7C41DA-D18F-445E-89EC-23753386F40D}" dt="2023-12-13T17:22:30.082" v="3266"/>
+        <pc:sldMasterMkLst>
+          <pc:docMk/>
+          <pc:sldMasterMk cId="2638820901" sldId="2147483648"/>
+        </pc:sldMasterMkLst>
+        <pc:sldLayoutChg chg="setBg">
+          <pc:chgData name="Benjamin Herzberger" userId="3bec8798b78bcecb" providerId="LiveId" clId="{0A7C41DA-D18F-445E-89EC-23753386F40D}" dt="2023-12-13T17:22:30.082" v="3266"/>
+          <pc:sldLayoutMkLst>
+            <pc:docMk/>
+            <pc:sldMasterMk cId="2638820901" sldId="2147483648"/>
+            <pc:sldLayoutMk cId="1885965919" sldId="2147483649"/>
+          </pc:sldLayoutMkLst>
+        </pc:sldLayoutChg>
+        <pc:sldLayoutChg chg="setBg">
+          <pc:chgData name="Benjamin Herzberger" userId="3bec8798b78bcecb" providerId="LiveId" clId="{0A7C41DA-D18F-445E-89EC-23753386F40D}" dt="2023-12-13T17:22:30.082" v="3266"/>
+          <pc:sldLayoutMkLst>
+            <pc:docMk/>
+            <pc:sldMasterMk cId="2638820901" sldId="2147483648"/>
+            <pc:sldLayoutMk cId="273912250" sldId="2147483650"/>
+          </pc:sldLayoutMkLst>
+        </pc:sldLayoutChg>
+        <pc:sldLayoutChg chg="setBg">
+          <pc:chgData name="Benjamin Herzberger" userId="3bec8798b78bcecb" providerId="LiveId" clId="{0A7C41DA-D18F-445E-89EC-23753386F40D}" dt="2023-12-13T17:22:30.082" v="3266"/>
+          <pc:sldLayoutMkLst>
+            <pc:docMk/>
+            <pc:sldMasterMk cId="2638820901" sldId="2147483648"/>
+            <pc:sldLayoutMk cId="2988966847" sldId="2147483651"/>
+          </pc:sldLayoutMkLst>
+        </pc:sldLayoutChg>
+        <pc:sldLayoutChg chg="setBg">
+          <pc:chgData name="Benjamin Herzberger" userId="3bec8798b78bcecb" providerId="LiveId" clId="{0A7C41DA-D18F-445E-89EC-23753386F40D}" dt="2023-12-13T17:22:30.082" v="3266"/>
+          <pc:sldLayoutMkLst>
+            <pc:docMk/>
+            <pc:sldMasterMk cId="2638820901" sldId="2147483648"/>
+            <pc:sldLayoutMk cId="677477453" sldId="2147483652"/>
+          </pc:sldLayoutMkLst>
+        </pc:sldLayoutChg>
+        <pc:sldLayoutChg chg="setBg">
+          <pc:chgData name="Benjamin Herzberger" userId="3bec8798b78bcecb" providerId="LiveId" clId="{0A7C41DA-D18F-445E-89EC-23753386F40D}" dt="2023-12-13T17:22:30.082" v="3266"/>
+          <pc:sldLayoutMkLst>
+            <pc:docMk/>
+            <pc:sldMasterMk cId="2638820901" sldId="2147483648"/>
+            <pc:sldLayoutMk cId="2948565416" sldId="2147483653"/>
+          </pc:sldLayoutMkLst>
+        </pc:sldLayoutChg>
+        <pc:sldLayoutChg chg="setBg">
+          <pc:chgData name="Benjamin Herzberger" userId="3bec8798b78bcecb" providerId="LiveId" clId="{0A7C41DA-D18F-445E-89EC-23753386F40D}" dt="2023-12-13T17:22:30.082" v="3266"/>
+          <pc:sldLayoutMkLst>
+            <pc:docMk/>
+            <pc:sldMasterMk cId="2638820901" sldId="2147483648"/>
+            <pc:sldLayoutMk cId="485802156" sldId="2147483654"/>
+          </pc:sldLayoutMkLst>
+        </pc:sldLayoutChg>
+        <pc:sldLayoutChg chg="setBg">
+          <pc:chgData name="Benjamin Herzberger" userId="3bec8798b78bcecb" providerId="LiveId" clId="{0A7C41DA-D18F-445E-89EC-23753386F40D}" dt="2023-12-13T17:22:30.082" v="3266"/>
+          <pc:sldLayoutMkLst>
+            <pc:docMk/>
+            <pc:sldMasterMk cId="2638820901" sldId="2147483648"/>
+            <pc:sldLayoutMk cId="1172816883" sldId="2147483655"/>
+          </pc:sldLayoutMkLst>
+        </pc:sldLayoutChg>
+        <pc:sldLayoutChg chg="setBg">
+          <pc:chgData name="Benjamin Herzberger" userId="3bec8798b78bcecb" providerId="LiveId" clId="{0A7C41DA-D18F-445E-89EC-23753386F40D}" dt="2023-12-13T17:22:30.082" v="3266"/>
+          <pc:sldLayoutMkLst>
+            <pc:docMk/>
+            <pc:sldMasterMk cId="2638820901" sldId="2147483648"/>
+            <pc:sldLayoutMk cId="498332993" sldId="2147483656"/>
+          </pc:sldLayoutMkLst>
+        </pc:sldLayoutChg>
+        <pc:sldLayoutChg chg="setBg">
+          <pc:chgData name="Benjamin Herzberger" userId="3bec8798b78bcecb" providerId="LiveId" clId="{0A7C41DA-D18F-445E-89EC-23753386F40D}" dt="2023-12-13T17:22:30.082" v="3266"/>
+          <pc:sldLayoutMkLst>
+            <pc:docMk/>
+            <pc:sldMasterMk cId="2638820901" sldId="2147483648"/>
+            <pc:sldLayoutMk cId="3810867030" sldId="2147483657"/>
+          </pc:sldLayoutMkLst>
+        </pc:sldLayoutChg>
+        <pc:sldLayoutChg chg="setBg">
+          <pc:chgData name="Benjamin Herzberger" userId="3bec8798b78bcecb" providerId="LiveId" clId="{0A7C41DA-D18F-445E-89EC-23753386F40D}" dt="2023-12-13T17:22:30.082" v="3266"/>
+          <pc:sldLayoutMkLst>
+            <pc:docMk/>
+            <pc:sldMasterMk cId="2638820901" sldId="2147483648"/>
+            <pc:sldLayoutMk cId="851654207" sldId="2147483658"/>
+          </pc:sldLayoutMkLst>
+        </pc:sldLayoutChg>
+        <pc:sldLayoutChg chg="setBg">
+          <pc:chgData name="Benjamin Herzberger" userId="3bec8798b78bcecb" providerId="LiveId" clId="{0A7C41DA-D18F-445E-89EC-23753386F40D}" dt="2023-12-13T17:22:30.082" v="3266"/>
+          <pc:sldLayoutMkLst>
+            <pc:docMk/>
+            <pc:sldMasterMk cId="2638820901" sldId="2147483648"/>
+            <pc:sldLayoutMk cId="3429387435" sldId="2147483659"/>
+          </pc:sldLayoutMkLst>
+        </pc:sldLayoutChg>
+      </pc:sldMasterChg>
     </pc:docChg>
   </pc:docChgLst>
 </pc:chgInfo>
@@ -370,7 +495,7 @@
           <a:p>
             <a:fld id="{F92B44B4-61D9-44FD-9F9D-40543DD8A042}" type="datetime1">
               <a:rPr lang="en-US" smtClean="0"/>
-              <a:t>12/10/2023</a:t>
+              <a:t>12/13/2023</a:t>
             </a:fld>
             <a:endParaRPr lang="en-US"/>
           </a:p>
@@ -551,7 +676,7 @@
           <a:p>
             <a:fld id="{E7BD2E14-E872-4FED-9D9D-4703FB727619}" type="datetime1">
               <a:rPr lang="en-US" smtClean="0"/>
-              <a:t>12/10/2023</a:t>
+              <a:t>12/13/2023</a:t>
             </a:fld>
             <a:endParaRPr lang="en-US"/>
           </a:p>
@@ -972,7 +1097,7 @@
           <a:p>
             <a:fld id="{046E0221-5632-43C1-9F08-A789EB9640F0}" type="datetime1">
               <a:rPr lang="en-US" smtClean="0"/>
-              <a:t>12/10/2023</a:t>
+              <a:t>12/13/2023</a:t>
             </a:fld>
             <a:endParaRPr lang="en-US"/>
           </a:p>
@@ -1172,7 +1297,7 @@
           <a:p>
             <a:fld id="{46BA8484-7B80-4A5E-9A1C-6FB1060CD2D0}" type="datetime1">
               <a:rPr lang="en-US" smtClean="0"/>
-              <a:t>12/10/2023</a:t>
+              <a:t>12/13/2023</a:t>
             </a:fld>
             <a:endParaRPr lang="en-US"/>
           </a:p>
@@ -1382,7 +1507,7 @@
           <a:p>
             <a:fld id="{964C24CF-D3FA-4145-8BEC-0FF1CC384B86}" type="datetime1">
               <a:rPr lang="en-US" smtClean="0"/>
-              <a:t>12/10/2023</a:t>
+              <a:t>12/13/2023</a:t>
             </a:fld>
             <a:endParaRPr lang="en-US"/>
           </a:p>
@@ -1582,7 +1707,7 @@
           <a:p>
             <a:fld id="{2C618A7A-78AE-44D5-8DAA-123704FBACCB}" type="datetime1">
               <a:rPr lang="en-US" smtClean="0"/>
-              <a:t>12/10/2023</a:t>
+              <a:t>12/13/2023</a:t>
             </a:fld>
             <a:endParaRPr lang="en-US"/>
           </a:p>
@@ -1858,7 +1983,7 @@
           <a:p>
             <a:fld id="{BBB77CA4-4924-4928-B03F-DF2822E37B1A}" type="datetime1">
               <a:rPr lang="en-US" smtClean="0"/>
-              <a:t>12/10/2023</a:t>
+              <a:t>12/13/2023</a:t>
             </a:fld>
             <a:endParaRPr lang="en-US"/>
           </a:p>
@@ -2126,7 +2251,7 @@
           <a:p>
             <a:fld id="{001346F1-59CD-4606-AB40-4D2BB43AA4B0}" type="datetime1">
               <a:rPr lang="en-US" smtClean="0"/>
-              <a:t>12/10/2023</a:t>
+              <a:t>12/13/2023</a:t>
             </a:fld>
             <a:endParaRPr lang="en-US"/>
           </a:p>
@@ -2541,7 +2666,7 @@
           <a:p>
             <a:fld id="{CC51C06D-B65F-4A09-983C-C45296990354}" type="datetime1">
               <a:rPr lang="en-US" smtClean="0"/>
-              <a:t>12/10/2023</a:t>
+              <a:t>12/13/2023</a:t>
             </a:fld>
             <a:endParaRPr lang="en-US"/>
           </a:p>
@@ -2683,7 +2808,7 @@
           <a:p>
             <a:fld id="{1A3A93C2-8788-4F70-98CF-DDDA0FEC59E0}" type="datetime1">
               <a:rPr lang="en-US" smtClean="0"/>
-              <a:t>12/10/2023</a:t>
+              <a:t>12/13/2023</a:t>
             </a:fld>
             <a:endParaRPr lang="en-US"/>
           </a:p>
@@ -2796,7 +2921,7 @@
           <a:p>
             <a:fld id="{6974239B-0974-429F-A782-12A2F9661C8E}" type="datetime1">
               <a:rPr lang="en-US" smtClean="0"/>
-              <a:t>12/10/2023</a:t>
+              <a:t>12/13/2023</a:t>
             </a:fld>
             <a:endParaRPr lang="en-US"/>
           </a:p>
@@ -3109,7 +3234,7 @@
           <a:p>
             <a:fld id="{B4A449CB-531D-4487-9638-91757C21E7EB}" type="datetime1">
               <a:rPr lang="en-US" smtClean="0"/>
-              <a:t>12/10/2023</a:t>
+              <a:t>12/13/2023</a:t>
             </a:fld>
             <a:endParaRPr lang="en-US"/>
           </a:p>
@@ -3398,7 +3523,7 @@
           <a:p>
             <a:fld id="{55CC263B-2D60-4807-B83C-32ADE9FA200B}" type="datetime1">
               <a:rPr lang="en-US" smtClean="0"/>
-              <a:t>12/10/2023</a:t>
+              <a:t>12/13/2023</a:t>
             </a:fld>
             <a:endParaRPr lang="en-US"/>
           </a:p>
@@ -3475,9 +3600,37 @@
 <p:sldMaster xmlns:a="http://schemas.openxmlformats.org/drawingml/2006/main" xmlns:r="http://schemas.openxmlformats.org/officeDocument/2006/relationships" xmlns:p="http://schemas.openxmlformats.org/presentationml/2006/main">
   <p:cSld>
     <p:bg>
-      <p:bgRef idx="1001">
-        <a:schemeClr val="bg1"/>
-      </p:bgRef>
+      <p:bgPr>
+        <a:gradFill flip="none" rotWithShape="1">
+          <a:gsLst>
+            <a:gs pos="50000">
+              <a:schemeClr val="bg2">
+                <a:tint val="80000"/>
+                <a:satMod val="250000"/>
+              </a:schemeClr>
+            </a:gs>
+            <a:gs pos="76000">
+              <a:schemeClr val="bg2">
+                <a:tint val="90000"/>
+                <a:shade val="90000"/>
+                <a:satMod val="200000"/>
+              </a:schemeClr>
+            </a:gs>
+            <a:gs pos="92000">
+              <a:schemeClr val="bg2">
+                <a:tint val="90000"/>
+                <a:shade val="70000"/>
+                <a:satMod val="250000"/>
+              </a:schemeClr>
+            </a:gs>
+          </a:gsLst>
+          <a:path path="circle">
+            <a:fillToRect l="50000" t="50000" r="50000" b="50000"/>
+          </a:path>
+          <a:tileRect/>
+        </a:gradFill>
+        <a:effectLst/>
+      </p:bgPr>
     </p:bg>
     <p:spTree>
       <p:nvGrpSpPr>
@@ -3641,7 +3794,7 @@
           <a:p>
             <a:fld id="{E18110E4-4BB1-45B4-898C-DCA66D0B787C}" type="datetime1">
               <a:rPr lang="en-US" smtClean="0"/>
-              <a:t>12/10/2023</a:t>
+              <a:t>12/13/2023</a:t>
             </a:fld>
             <a:endParaRPr lang="en-US"/>
           </a:p>
@@ -4081,34 +4234,14 @@
           <a:lstStyle/>
           <a:p>
             <a:r>
-              <a:rPr lang="de-DE" dirty="0"/>
-              <a:t>DS500: </a:t>
-            </a:r>
-            <a:r>
-              <a:rPr lang="de-DE" dirty="0" err="1"/>
-              <a:t>Does</a:t>
-            </a:r>
-            <a:r>
-              <a:rPr lang="de-DE" dirty="0"/>
-              <a:t> </a:t>
-            </a:r>
-            <a:r>
-              <a:rPr lang="de-DE" dirty="0" err="1"/>
-              <a:t>ChatGPT</a:t>
-            </a:r>
-            <a:r>
-              <a:rPr lang="de-DE" dirty="0"/>
-              <a:t> </a:t>
-            </a:r>
-            <a:r>
-              <a:rPr lang="de-DE" dirty="0" err="1"/>
-              <a:t>behave</a:t>
-            </a:r>
-            <a:r>
-              <a:rPr lang="de-DE" dirty="0"/>
-              <a:t> like a human?</a:t>
-            </a:r>
-            <a:endParaRPr lang="en-US" dirty="0"/>
+              <a:rPr lang="de-DE" dirty="0">
+                <a:latin typeface="Century Gothic" panose="020B0502020202020204" pitchFamily="34" charset="0"/>
+              </a:rPr>
+              <a:t>DS500: Does ChatGPT behave like a human?</a:t>
+            </a:r>
+            <a:endParaRPr lang="en-US" dirty="0">
+              <a:latin typeface="Century Gothic" panose="020B0502020202020204" pitchFamily="34" charset="0"/>
+            </a:endParaRPr>
           </a:p>
         </p:txBody>
       </p:sp>
@@ -4141,44 +4274,38 @@
           <a:lstStyle/>
           <a:p>
             <a:r>
-              <a:rPr lang="de-DE" sz="1800" dirty="0"/>
+              <a:rPr lang="de-DE" sz="1800" dirty="0">
+                <a:latin typeface="Palatino Linotype" panose="02040502050505030304" pitchFamily="18" charset="0"/>
+              </a:rPr>
               <a:t>By Marius Knipp, Benjamin Herzberger</a:t>
             </a:r>
           </a:p>
           <a:p>
             <a:r>
-              <a:rPr lang="de-DE" sz="1800" dirty="0"/>
-              <a:t>Winter </a:t>
-            </a:r>
-            <a:r>
-              <a:rPr lang="de-DE" sz="1800" dirty="0" err="1"/>
-              <a:t>term</a:t>
-            </a:r>
-            <a:r>
-              <a:rPr lang="de-DE" sz="1800" dirty="0"/>
-              <a:t> 2023/2024</a:t>
-            </a:r>
-          </a:p>
-          <a:p>
-            <a:r>
-              <a:rPr lang="de-DE" sz="1800" dirty="0"/>
+              <a:rPr lang="de-DE" sz="1800" dirty="0">
+                <a:latin typeface="Palatino Linotype" panose="02040502050505030304" pitchFamily="18" charset="0"/>
+              </a:rPr>
+              <a:t>Winter term 2023/2024</a:t>
+            </a:r>
+          </a:p>
+          <a:p>
+            <a:r>
+              <a:rPr lang="de-DE" sz="1800" dirty="0">
+                <a:latin typeface="Palatino Linotype" panose="02040502050505030304" pitchFamily="18" charset="0"/>
+              </a:rPr>
               <a:t>Eberhard Karls Universität Tübingen</a:t>
             </a:r>
           </a:p>
           <a:p>
             <a:r>
-              <a:rPr lang="de-DE" sz="1800" dirty="0"/>
-              <a:t>Chair </a:t>
-            </a:r>
-            <a:r>
-              <a:rPr lang="de-DE" sz="1800" dirty="0" err="1"/>
-              <a:t>of</a:t>
-            </a:r>
-            <a:r>
-              <a:rPr lang="de-DE" sz="1800" dirty="0"/>
-              <a:t> Marketing</a:t>
-            </a:r>
-            <a:endParaRPr lang="en-US" sz="1800" dirty="0"/>
+              <a:rPr lang="de-DE" sz="1800" dirty="0">
+                <a:latin typeface="Palatino Linotype" panose="02040502050505030304" pitchFamily="18" charset="0"/>
+              </a:rPr>
+              <a:t>Chair of Marketing</a:t>
+            </a:r>
+            <a:endParaRPr lang="en-US" sz="1800" dirty="0">
+              <a:latin typeface="Palatino Linotype" panose="02040502050505030304" pitchFamily="18" charset="0"/>
+            </a:endParaRPr>
           </a:p>
         </p:txBody>
       </p:sp>
@@ -4217,7 +4344,7 @@
           <p:cNvPr id="2" name="Titel 1">
             <a:extLst>
               <a:ext uri="{FF2B5EF4-FFF2-40B4-BE49-F238E27FC236}">
-                <a16:creationId xmlns:a16="http://schemas.microsoft.com/office/drawing/2014/main" id="{4DB6D0AC-D8FF-5908-18A5-1A0FE9E7C808}"/>
+                <a16:creationId xmlns:a16="http://schemas.microsoft.com/office/drawing/2014/main" id="{4A022FB2-6150-D97D-DAEB-22C1A4C16264}"/>
               </a:ext>
             </a:extLst>
           </p:cNvPr>
@@ -4230,8 +4357,8 @@
         </p:nvSpPr>
         <p:spPr>
           <a:xfrm>
-            <a:off x="838200" y="0"/>
-            <a:ext cx="10515600" cy="1325563"/>
+            <a:off x="471055" y="-8626"/>
+            <a:ext cx="11700000" cy="1325563"/>
           </a:xfrm>
         </p:spPr>
         <p:txBody>
@@ -4241,18 +4368,68 @@
           <a:lstStyle/>
           <a:p>
             <a:r>
-              <a:rPr lang="de-DE" sz="3600" dirty="0"/>
-              <a:t>LLMs hold </a:t>
-            </a:r>
-            <a:r>
-              <a:rPr lang="de-DE" sz="3600" dirty="0" err="1"/>
-              <a:t>huge</a:t>
-            </a:r>
-            <a:r>
-              <a:rPr lang="de-DE" sz="3600" dirty="0"/>
-              <a:t> potential </a:t>
-            </a:r>
-            <a:endParaRPr lang="en-US" sz="3600" dirty="0"/>
+              <a:rPr lang="de-DE" sz="3600" dirty="0">
+                <a:latin typeface="Century Gothic" panose="020B0502020202020204" pitchFamily="34" charset="0"/>
+              </a:rPr>
+              <a:t>LLMs </a:t>
+            </a:r>
+            <a:r>
+              <a:rPr lang="de-DE" sz="3600" dirty="0" err="1">
+                <a:latin typeface="Century Gothic" panose="020B0502020202020204" pitchFamily="34" charset="0"/>
+              </a:rPr>
+              <a:t>could</a:t>
+            </a:r>
+            <a:r>
+              <a:rPr lang="de-DE" sz="3600" dirty="0">
+                <a:latin typeface="Century Gothic" panose="020B0502020202020204" pitchFamily="34" charset="0"/>
+              </a:rPr>
+              <a:t> </a:t>
+            </a:r>
+            <a:r>
+              <a:rPr lang="de-DE" sz="3600" dirty="0" err="1">
+                <a:latin typeface="Century Gothic" panose="020B0502020202020204" pitchFamily="34" charset="0"/>
+              </a:rPr>
+              <a:t>act</a:t>
+            </a:r>
+            <a:r>
+              <a:rPr lang="de-DE" sz="3600" dirty="0">
+                <a:latin typeface="Century Gothic" panose="020B0502020202020204" pitchFamily="34" charset="0"/>
+              </a:rPr>
+              <a:t> </a:t>
+            </a:r>
+            <a:r>
+              <a:rPr lang="de-DE" sz="3600" dirty="0" err="1">
+                <a:latin typeface="Century Gothic" panose="020B0502020202020204" pitchFamily="34" charset="0"/>
+              </a:rPr>
+              <a:t>as</a:t>
+            </a:r>
+            <a:r>
+              <a:rPr lang="de-DE" sz="3600" dirty="0">
+                <a:latin typeface="Century Gothic" panose="020B0502020202020204" pitchFamily="34" charset="0"/>
+              </a:rPr>
+              <a:t> </a:t>
+            </a:r>
+            <a:r>
+              <a:rPr lang="de-DE" sz="3600" dirty="0" err="1">
+                <a:latin typeface="Century Gothic" panose="020B0502020202020204" pitchFamily="34" charset="0"/>
+              </a:rPr>
+              <a:t>surrogates</a:t>
+            </a:r>
+            <a:r>
+              <a:rPr lang="de-DE" sz="3600" dirty="0">
+                <a:latin typeface="Century Gothic" panose="020B0502020202020204" pitchFamily="34" charset="0"/>
+              </a:rPr>
+              <a:t> in (market) </a:t>
+            </a:r>
+            <a:r>
+              <a:rPr lang="de-DE" sz="3600" dirty="0" err="1">
+                <a:latin typeface="Century Gothic" panose="020B0502020202020204" pitchFamily="34" charset="0"/>
+              </a:rPr>
+              <a:t>research</a:t>
+            </a:r>
+            <a:endParaRPr lang="en-US" sz="3600" dirty="0">
+              <a:latin typeface="Century Gothic" panose="020B0502020202020204" pitchFamily="34" charset="0"/>
+            </a:endParaRPr>
           </a:p>
         </p:txBody>
       </p:sp>
@@ -4261,7 +4438,7 @@
           <p:cNvPr id="3" name="Inhaltsplatzhalter 2">
             <a:extLst>
               <a:ext uri="{FF2B5EF4-FFF2-40B4-BE49-F238E27FC236}">
-                <a16:creationId xmlns:a16="http://schemas.microsoft.com/office/drawing/2014/main" id="{AF6A3198-28AA-7E2E-73DC-1F66F748FE6B}"/>
+                <a16:creationId xmlns:a16="http://schemas.microsoft.com/office/drawing/2014/main" id="{7747FD6F-89DB-6912-D680-95CE4EB6D353}"/>
               </a:ext>
             </a:extLst>
           </p:cNvPr>
@@ -4274,344 +4451,390 @@
         </p:nvSpPr>
         <p:spPr>
           <a:xfrm>
-            <a:off x="838200" y="1325563"/>
+            <a:off x="838200" y="1316937"/>
             <a:ext cx="10515600" cy="4351338"/>
           </a:xfrm>
         </p:spPr>
         <p:txBody>
           <a:bodyPr>
-            <a:normAutofit fontScale="92500" lnSpcReduction="20000"/>
+            <a:normAutofit fontScale="92500"/>
           </a:bodyPr>
           <a:lstStyle/>
           <a:p>
             <a:r>
-              <a:rPr lang="de-DE" dirty="0"/>
-              <a:t>Type </a:t>
-            </a:r>
-            <a:r>
-              <a:rPr lang="de-DE" dirty="0" err="1"/>
-              <a:t>of</a:t>
-            </a:r>
-            <a:r>
-              <a:rPr lang="de-DE" dirty="0"/>
-              <a:t> AI </a:t>
-            </a:r>
-            <a:r>
-              <a:rPr lang="de-DE" dirty="0" err="1"/>
+              <a:rPr lang="de-DE" dirty="0">
+                <a:latin typeface="Palatino Linotype" panose="02040502050505030304" pitchFamily="18" charset="0"/>
+              </a:rPr>
+              <a:t>Type of AI </a:t>
+            </a:r>
+            <a:r>
+              <a:rPr lang="de-DE" dirty="0" err="1">
+                <a:latin typeface="Palatino Linotype" panose="02040502050505030304" pitchFamily="18" charset="0"/>
+              </a:rPr>
               <a:t>that</a:t>
             </a:r>
             <a:r>
-              <a:rPr lang="de-DE" dirty="0"/>
+              <a:rPr lang="de-DE" dirty="0">
+                <a:latin typeface="Palatino Linotype" panose="02040502050505030304" pitchFamily="18" charset="0"/>
+              </a:rPr>
               <a:t> </a:t>
             </a:r>
             <a:r>
-              <a:rPr lang="de-DE" dirty="0" err="1"/>
+              <a:rPr lang="de-DE" dirty="0" err="1">
+                <a:latin typeface="Palatino Linotype" panose="02040502050505030304" pitchFamily="18" charset="0"/>
+              </a:rPr>
               <a:t>understands</a:t>
             </a:r>
             <a:r>
-              <a:rPr lang="de-DE" dirty="0"/>
+              <a:rPr lang="de-DE" dirty="0">
+                <a:latin typeface="Palatino Linotype" panose="02040502050505030304" pitchFamily="18" charset="0"/>
+              </a:rPr>
               <a:t> and </a:t>
             </a:r>
             <a:r>
-              <a:rPr lang="de-DE" dirty="0" err="1"/>
+              <a:rPr lang="de-DE" dirty="0" err="1">
+                <a:latin typeface="Palatino Linotype" panose="02040502050505030304" pitchFamily="18" charset="0"/>
+              </a:rPr>
               <a:t>generates</a:t>
             </a:r>
             <a:r>
-              <a:rPr lang="de-DE" dirty="0"/>
+              <a:rPr lang="de-DE" dirty="0">
+                <a:latin typeface="Palatino Linotype" panose="02040502050505030304" pitchFamily="18" charset="0"/>
+              </a:rPr>
               <a:t> human-like </a:t>
             </a:r>
             <a:r>
-              <a:rPr lang="de-DE" dirty="0" err="1"/>
+              <a:rPr lang="de-DE" dirty="0" err="1">
+                <a:latin typeface="Palatino Linotype" panose="02040502050505030304" pitchFamily="18" charset="0"/>
+              </a:rPr>
               <a:t>language</a:t>
             </a:r>
-            <a:endParaRPr lang="de-DE" dirty="0"/>
+            <a:endParaRPr lang="de-DE" dirty="0">
+              <a:latin typeface="Palatino Linotype" panose="02040502050505030304" pitchFamily="18" charset="0"/>
+            </a:endParaRPr>
           </a:p>
           <a:p>
             <a:pPr lvl="1"/>
             <a:r>
-              <a:rPr lang="de-DE" dirty="0" err="1"/>
+              <a:rPr lang="de-DE" dirty="0" err="1">
+                <a:latin typeface="Palatino Linotype" panose="02040502050505030304" pitchFamily="18" charset="0"/>
+              </a:rPr>
               <a:t>Responds</a:t>
             </a:r>
             <a:r>
-              <a:rPr lang="de-DE" dirty="0"/>
+              <a:rPr lang="de-DE" dirty="0">
+                <a:latin typeface="Palatino Linotype" panose="02040502050505030304" pitchFamily="18" charset="0"/>
+              </a:rPr>
               <a:t> </a:t>
             </a:r>
             <a:r>
-              <a:rPr lang="de-DE" dirty="0" err="1"/>
+              <a:rPr lang="de-DE" dirty="0" err="1">
+                <a:latin typeface="Palatino Linotype" panose="02040502050505030304" pitchFamily="18" charset="0"/>
+              </a:rPr>
               <a:t>with</a:t>
             </a:r>
             <a:r>
-              <a:rPr lang="de-DE" dirty="0"/>
+              <a:rPr lang="de-DE" dirty="0">
+                <a:latin typeface="Palatino Linotype" panose="02040502050505030304" pitchFamily="18" charset="0"/>
+              </a:rPr>
               <a:t> </a:t>
             </a:r>
             <a:r>
-              <a:rPr lang="de-DE" dirty="0" err="1"/>
+              <a:rPr lang="de-DE" dirty="0" err="1">
+                <a:latin typeface="Palatino Linotype" panose="02040502050505030304" pitchFamily="18" charset="0"/>
+              </a:rPr>
               <a:t>most</a:t>
             </a:r>
             <a:r>
-              <a:rPr lang="de-DE" dirty="0"/>
+              <a:rPr lang="de-DE" dirty="0">
+                <a:latin typeface="Palatino Linotype" panose="02040502050505030304" pitchFamily="18" charset="0"/>
+              </a:rPr>
               <a:t> </a:t>
             </a:r>
             <a:r>
-              <a:rPr lang="de-DE" dirty="0" err="1"/>
+              <a:rPr lang="de-DE" dirty="0" err="1">
+                <a:latin typeface="Palatino Linotype" panose="02040502050505030304" pitchFamily="18" charset="0"/>
+              </a:rPr>
               <a:t>likely</a:t>
             </a:r>
             <a:r>
-              <a:rPr lang="de-DE" dirty="0"/>
+              <a:rPr lang="de-DE" dirty="0">
+                <a:latin typeface="Palatino Linotype" panose="02040502050505030304" pitchFamily="18" charset="0"/>
+              </a:rPr>
               <a:t> </a:t>
             </a:r>
             <a:r>
-              <a:rPr lang="de-DE" dirty="0" err="1"/>
+              <a:rPr lang="de-DE" dirty="0" err="1">
+                <a:latin typeface="Palatino Linotype" panose="02040502050505030304" pitchFamily="18" charset="0"/>
+              </a:rPr>
               <a:t>next</a:t>
             </a:r>
             <a:r>
-              <a:rPr lang="de-DE" dirty="0"/>
+              <a:rPr lang="de-DE" dirty="0">
+                <a:latin typeface="Palatino Linotype" panose="02040502050505030304" pitchFamily="18" charset="0"/>
+              </a:rPr>
               <a:t> </a:t>
             </a:r>
             <a:r>
-              <a:rPr lang="de-DE" dirty="0" err="1"/>
+              <a:rPr lang="de-DE" dirty="0" err="1">
+                <a:latin typeface="Palatino Linotype" panose="02040502050505030304" pitchFamily="18" charset="0"/>
+              </a:rPr>
               <a:t>sequence</a:t>
             </a:r>
             <a:r>
-              <a:rPr lang="de-DE" dirty="0"/>
+              <a:rPr lang="de-DE" dirty="0">
+                <a:latin typeface="Palatino Linotype" panose="02040502050505030304" pitchFamily="18" charset="0"/>
+              </a:rPr>
+              <a:t> of </a:t>
+            </a:r>
+            <a:r>
+              <a:rPr lang="de-DE" dirty="0" err="1">
+                <a:latin typeface="Palatino Linotype" panose="02040502050505030304" pitchFamily="18" charset="0"/>
+              </a:rPr>
+              <a:t>text</a:t>
+            </a:r>
+            <a:endParaRPr lang="de-DE" dirty="0">
+              <a:latin typeface="Palatino Linotype" panose="02040502050505030304" pitchFamily="18" charset="0"/>
+            </a:endParaRPr>
+          </a:p>
+          <a:p>
+            <a:r>
+              <a:rPr lang="de-DE" dirty="0">
+                <a:latin typeface="Palatino Linotype" panose="02040502050505030304" pitchFamily="18" charset="0"/>
+              </a:rPr>
+              <a:t>Models </a:t>
+            </a:r>
+            <a:r>
+              <a:rPr lang="de-DE" dirty="0" err="1">
+                <a:latin typeface="Palatino Linotype" panose="02040502050505030304" pitchFamily="18" charset="0"/>
+              </a:rPr>
+              <a:t>trained</a:t>
+            </a:r>
+            <a:r>
+              <a:rPr lang="de-DE" dirty="0">
+                <a:latin typeface="Palatino Linotype" panose="02040502050505030304" pitchFamily="18" charset="0"/>
+              </a:rPr>
+              <a:t> on </a:t>
+            </a:r>
+            <a:r>
+              <a:rPr lang="de-DE" dirty="0" err="1">
+                <a:latin typeface="Palatino Linotype" panose="02040502050505030304" pitchFamily="18" charset="0"/>
+              </a:rPr>
+              <a:t>vast</a:t>
+            </a:r>
+            <a:r>
+              <a:rPr lang="de-DE" dirty="0">
+                <a:latin typeface="Palatino Linotype" panose="02040502050505030304" pitchFamily="18" charset="0"/>
+              </a:rPr>
               <a:t> </a:t>
             </a:r>
             <a:r>
-              <a:rPr lang="de-DE" dirty="0" err="1"/>
-              <a:t>of</a:t>
-            </a:r>
-            <a:r>
-              <a:rPr lang="de-DE" dirty="0"/>
+              <a:rPr lang="de-DE" dirty="0" err="1">
+                <a:latin typeface="Palatino Linotype" panose="02040502050505030304" pitchFamily="18" charset="0"/>
+              </a:rPr>
+              <a:t>amount</a:t>
+            </a:r>
+            <a:r>
+              <a:rPr lang="de-DE" dirty="0">
+                <a:latin typeface="Palatino Linotype" panose="02040502050505030304" pitchFamily="18" charset="0"/>
+              </a:rPr>
+              <a:t> of </a:t>
+            </a:r>
+            <a:r>
+              <a:rPr lang="de-DE" dirty="0" err="1">
+                <a:latin typeface="Palatino Linotype" panose="02040502050505030304" pitchFamily="18" charset="0"/>
+              </a:rPr>
+              <a:t>text</a:t>
+            </a:r>
+            <a:r>
+              <a:rPr lang="de-DE" dirty="0">
+                <a:latin typeface="Palatino Linotype" panose="02040502050505030304" pitchFamily="18" charset="0"/>
+              </a:rPr>
               <a:t> </a:t>
             </a:r>
             <a:r>
-              <a:rPr lang="de-DE" dirty="0" err="1"/>
-              <a:t>text</a:t>
-            </a:r>
-            <a:endParaRPr lang="de-DE" dirty="0"/>
-          </a:p>
-          <a:p>
-            <a:r>
-              <a:rPr lang="de-DE" dirty="0" err="1"/>
-              <a:t>Trained</a:t>
-            </a:r>
-            <a:r>
-              <a:rPr lang="de-DE" dirty="0"/>
-              <a:t> on </a:t>
-            </a:r>
-            <a:r>
-              <a:rPr lang="de-DE" dirty="0" err="1"/>
-              <a:t>vast</a:t>
-            </a:r>
-            <a:r>
-              <a:rPr lang="de-DE" dirty="0"/>
+              <a:rPr lang="de-DE" dirty="0" err="1">
+                <a:latin typeface="Palatino Linotype" panose="02040502050505030304" pitchFamily="18" charset="0"/>
+              </a:rPr>
+              <a:t>data</a:t>
+            </a:r>
+            <a:r>
+              <a:rPr lang="de-DE" dirty="0">
+                <a:latin typeface="Palatino Linotype" panose="02040502050505030304" pitchFamily="18" charset="0"/>
+              </a:rPr>
+              <a:t> from </a:t>
+            </a:r>
+            <a:r>
+              <a:rPr lang="de-DE" dirty="0" err="1">
+                <a:latin typeface="Palatino Linotype" panose="02040502050505030304" pitchFamily="18" charset="0"/>
+              </a:rPr>
+              <a:t>the</a:t>
+            </a:r>
+            <a:r>
+              <a:rPr lang="de-DE" dirty="0">
+                <a:latin typeface="Palatino Linotype" panose="02040502050505030304" pitchFamily="18" charset="0"/>
+              </a:rPr>
               <a:t> </a:t>
             </a:r>
             <a:r>
-              <a:rPr lang="de-DE" dirty="0" err="1"/>
-              <a:t>amount</a:t>
-            </a:r>
-            <a:r>
-              <a:rPr lang="de-DE" dirty="0"/>
+              <a:rPr lang="de-DE" dirty="0" err="1">
+                <a:latin typeface="Palatino Linotype" panose="02040502050505030304" pitchFamily="18" charset="0"/>
+              </a:rPr>
+              <a:t>internet</a:t>
+            </a:r>
+            <a:r>
+              <a:rPr lang="de-DE" dirty="0">
+                <a:latin typeface="Palatino Linotype" panose="02040502050505030304" pitchFamily="18" charset="0"/>
+              </a:rPr>
+              <a:t>, </a:t>
+            </a:r>
+            <a:r>
+              <a:rPr lang="de-DE" dirty="0" err="1">
+                <a:latin typeface="Palatino Linotype" panose="02040502050505030304" pitchFamily="18" charset="0"/>
+              </a:rPr>
+              <a:t>which</a:t>
+            </a:r>
+            <a:r>
+              <a:rPr lang="de-DE" dirty="0">
+                <a:latin typeface="Palatino Linotype" panose="02040502050505030304" pitchFamily="18" charset="0"/>
+              </a:rPr>
               <a:t> </a:t>
             </a:r>
             <a:r>
-              <a:rPr lang="de-DE" dirty="0" err="1"/>
-              <a:t>of</a:t>
-            </a:r>
-            <a:r>
-              <a:rPr lang="de-DE" dirty="0"/>
+              <a:rPr lang="de-DE" dirty="0" err="1">
+                <a:latin typeface="Palatino Linotype" panose="02040502050505030304" pitchFamily="18" charset="0"/>
+              </a:rPr>
+              <a:t>might</a:t>
+            </a:r>
+            <a:r>
+              <a:rPr lang="de-DE" dirty="0">
+                <a:latin typeface="Palatino Linotype" panose="02040502050505030304" pitchFamily="18" charset="0"/>
+              </a:rPr>
               <a:t> </a:t>
             </a:r>
             <a:r>
-              <a:rPr lang="de-DE" dirty="0" err="1"/>
-              <a:t>text</a:t>
-            </a:r>
-            <a:r>
-              <a:rPr lang="de-DE" dirty="0"/>
+              <a:rPr lang="de-DE" dirty="0" err="1">
+                <a:latin typeface="Palatino Linotype" panose="02040502050505030304" pitchFamily="18" charset="0"/>
+              </a:rPr>
+              <a:t>include</a:t>
+            </a:r>
+            <a:r>
+              <a:rPr lang="de-DE" dirty="0">
+                <a:latin typeface="Palatino Linotype" panose="02040502050505030304" pitchFamily="18" charset="0"/>
+              </a:rPr>
+              <a:t>:</a:t>
+            </a:r>
+            <a:r>
+              <a:rPr lang="en-US" dirty="0">
+                <a:latin typeface="Palatino Linotype" panose="02040502050505030304" pitchFamily="18" charset="0"/>
+              </a:rPr>
+              <a:t> Product reviews, messaging boards, brand forums, … </a:t>
+            </a:r>
+            <a:endParaRPr lang="de-DE" dirty="0">
+              <a:latin typeface="Palatino Linotype" panose="02040502050505030304" pitchFamily="18" charset="0"/>
+            </a:endParaRPr>
+          </a:p>
+          <a:p>
+            <a:r>
+              <a:rPr lang="de-DE" dirty="0">
+                <a:latin typeface="Palatino Linotype" panose="02040502050505030304" pitchFamily="18" charset="0"/>
+              </a:rPr>
+              <a:t>Human </a:t>
+            </a:r>
+            <a:r>
+              <a:rPr lang="de-DE" dirty="0" err="1">
+                <a:latin typeface="Palatino Linotype" panose="02040502050505030304" pitchFamily="18" charset="0"/>
+              </a:rPr>
+              <a:t>individuals</a:t>
+            </a:r>
+            <a:r>
+              <a:rPr lang="de-DE" dirty="0">
+                <a:latin typeface="Palatino Linotype" panose="02040502050505030304" pitchFamily="18" charset="0"/>
+              </a:rPr>
               <a:t> </a:t>
             </a:r>
             <a:r>
-              <a:rPr lang="de-DE" dirty="0" err="1"/>
-              <a:t>data</a:t>
-            </a:r>
-            <a:r>
-              <a:rPr lang="de-DE" dirty="0"/>
+              <a:rPr lang="de-DE" dirty="0" err="1">
+                <a:latin typeface="Palatino Linotype" panose="02040502050505030304" pitchFamily="18" charset="0"/>
+              </a:rPr>
+              <a:t>discuss</a:t>
+            </a:r>
+            <a:r>
+              <a:rPr lang="de-DE" dirty="0">
+                <a:latin typeface="Palatino Linotype" panose="02040502050505030304" pitchFamily="18" charset="0"/>
+              </a:rPr>
               <a:t> </a:t>
             </a:r>
-          </a:p>
-          <a:p>
-            <a:r>
-              <a:rPr lang="de-DE" dirty="0"/>
-              <a:t>To </a:t>
-            </a:r>
-            <a:r>
-              <a:rPr lang="de-DE" dirty="0" err="1"/>
-              <a:t>some</a:t>
-            </a:r>
-            <a:r>
-              <a:rPr lang="de-DE" dirty="0"/>
+            <a:r>
+              <a:rPr lang="de-DE" dirty="0" err="1">
+                <a:latin typeface="Palatino Linotype" panose="02040502050505030304" pitchFamily="18" charset="0"/>
+              </a:rPr>
+              <a:t>consumer</a:t>
+            </a:r>
+            <a:r>
+              <a:rPr lang="de-DE" dirty="0">
+                <a:latin typeface="Palatino Linotype" panose="02040502050505030304" pitchFamily="18" charset="0"/>
+              </a:rPr>
               <a:t> </a:t>
             </a:r>
             <a:r>
-              <a:rPr lang="de-DE" dirty="0" err="1"/>
-              <a:t>extent</a:t>
-            </a:r>
-            <a:r>
-              <a:rPr lang="de-DE" dirty="0"/>
-              <a:t> </a:t>
-            </a:r>
-            <a:r>
-              <a:rPr lang="de-DE" dirty="0" err="1"/>
-              <a:t>even</a:t>
-            </a:r>
-            <a:r>
-              <a:rPr lang="de-DE" dirty="0"/>
-              <a:t> </a:t>
-            </a:r>
-            <a:r>
-              <a:rPr lang="de-DE" dirty="0" err="1"/>
-              <a:t>free</a:t>
-            </a:r>
-            <a:r>
-              <a:rPr lang="de-DE" dirty="0"/>
-              <a:t>-to-</a:t>
-            </a:r>
-            <a:r>
-              <a:rPr lang="de-DE" dirty="0" err="1"/>
-              <a:t>use</a:t>
-            </a:r>
-            <a:endParaRPr lang="de-DE" dirty="0"/>
-          </a:p>
-          <a:p>
-            <a:r>
-              <a:rPr lang="de-DE" dirty="0"/>
-              <a:t>Wide </a:t>
-            </a:r>
-            <a:r>
-              <a:rPr lang="de-DE" dirty="0" err="1"/>
-              <a:t>range</a:t>
-            </a:r>
-            <a:r>
-              <a:rPr lang="de-DE" dirty="0"/>
-              <a:t> </a:t>
-            </a:r>
-            <a:r>
-              <a:rPr lang="de-DE" dirty="0" err="1"/>
-              <a:t>of</a:t>
-            </a:r>
-            <a:r>
-              <a:rPr lang="de-DE" dirty="0"/>
-              <a:t> </a:t>
-            </a:r>
-            <a:r>
-              <a:rPr lang="de-DE" dirty="0" err="1"/>
-              <a:t>applications</a:t>
-            </a:r>
-            <a:r>
-              <a:rPr lang="de-DE" dirty="0"/>
-              <a:t>:</a:t>
-            </a:r>
-          </a:p>
-          <a:p>
-            <a:pPr lvl="1"/>
-            <a:r>
-              <a:rPr lang="de-DE" dirty="0"/>
-              <a:t>Language </a:t>
-            </a:r>
-            <a:r>
-              <a:rPr lang="de-DE" dirty="0" err="1"/>
-              <a:t>translation</a:t>
-            </a:r>
-            <a:endParaRPr lang="de-DE" dirty="0"/>
-          </a:p>
-          <a:p>
-            <a:pPr lvl="1"/>
-            <a:r>
-              <a:rPr lang="de-DE" dirty="0"/>
-              <a:t>Speech </a:t>
-            </a:r>
-            <a:r>
-              <a:rPr lang="de-DE" dirty="0" err="1"/>
-              <a:t>recognition</a:t>
-            </a:r>
-            <a:endParaRPr lang="de-DE" dirty="0"/>
-          </a:p>
-          <a:p>
-            <a:pPr lvl="1"/>
-            <a:r>
-              <a:rPr lang="de-DE" dirty="0"/>
-              <a:t>Content </a:t>
-            </a:r>
-            <a:r>
-              <a:rPr lang="de-DE" dirty="0" err="1"/>
-              <a:t>generation</a:t>
-            </a:r>
-            <a:endParaRPr lang="de-DE" dirty="0"/>
-          </a:p>
-          <a:p>
-            <a:pPr lvl="1"/>
-            <a:r>
-              <a:rPr lang="de-DE" dirty="0"/>
-              <a:t>Text </a:t>
-            </a:r>
-            <a:r>
-              <a:rPr lang="de-DE" dirty="0" err="1"/>
-              <a:t>classification</a:t>
-            </a:r>
-            <a:endParaRPr lang="de-DE" dirty="0"/>
-          </a:p>
-          <a:p>
-            <a:r>
-              <a:rPr lang="de-DE" dirty="0"/>
-              <a:t>AI-augmentation: GitHub Copilot</a:t>
-            </a:r>
-          </a:p>
-          <a:p>
-            <a:endParaRPr lang="de-DE" dirty="0"/>
+              <a:rPr lang="de-DE" dirty="0" err="1">
+                <a:latin typeface="Palatino Linotype" panose="02040502050505030304" pitchFamily="18" charset="0"/>
+              </a:rPr>
+              <a:t>preferences</a:t>
+            </a:r>
+            <a:r>
+              <a:rPr lang="de-DE" dirty="0">
+                <a:latin typeface="Palatino Linotype" panose="02040502050505030304" pitchFamily="18" charset="0"/>
+              </a:rPr>
+              <a:t> online</a:t>
+            </a:r>
+          </a:p>
+          <a:p>
+            <a:r>
+              <a:rPr lang="en-US" dirty="0">
+                <a:latin typeface="Palatino Linotype" panose="02040502050505030304" pitchFamily="18" charset="0"/>
+              </a:rPr>
+              <a:t>If training data includes these discussions, we expect  the answers of LLMs to reflect those preferences</a:t>
+            </a:r>
+          </a:p>
+          <a:p>
+            <a:r>
+              <a:rPr lang="en-US" dirty="0">
+                <a:latin typeface="Palatino Linotype" panose="02040502050505030304" pitchFamily="18" charset="0"/>
+              </a:rPr>
+              <a:t>Market research tools e.g. conjoint analysis or focus group discussions are expensive</a:t>
+            </a:r>
+          </a:p>
+          <a:p>
+            <a:r>
+              <a:rPr lang="en-US" dirty="0">
+                <a:latin typeface="Palatino Linotype" panose="02040502050505030304" pitchFamily="18" charset="0"/>
+              </a:rPr>
+              <a:t>LLM’s could serve as a fast and low-cost alternative</a:t>
+            </a:r>
           </a:p>
           <a:p>
             <a:pPr marL="0" indent="0">
               <a:buNone/>
             </a:pPr>
-            <a:r>
-              <a:rPr lang="de-DE" dirty="0"/>
-              <a:t>	   </a:t>
-            </a:r>
-            <a:r>
-              <a:rPr lang="de-DE" dirty="0" err="1"/>
-              <a:t>Becoming</a:t>
-            </a:r>
-            <a:r>
-              <a:rPr lang="de-DE" dirty="0"/>
-              <a:t> </a:t>
-            </a:r>
-            <a:r>
-              <a:rPr lang="de-DE" dirty="0" err="1"/>
-              <a:t>increasingly</a:t>
-            </a:r>
-            <a:r>
-              <a:rPr lang="de-DE" dirty="0"/>
-              <a:t> </a:t>
-            </a:r>
-            <a:r>
-              <a:rPr lang="de-DE" dirty="0" err="1"/>
-              <a:t>popular</a:t>
-            </a:r>
-            <a:r>
-              <a:rPr lang="de-DE" dirty="0"/>
-              <a:t> </a:t>
-            </a:r>
-            <a:endParaRPr lang="en-US" dirty="0"/>
-          </a:p>
-        </p:txBody>
-      </p:sp>
-      <p:sp>
-        <p:nvSpPr>
-          <p:cNvPr id="7" name="Fußzeilenplatzhalter 6">
-            <a:extLst>
-              <a:ext uri="{FF2B5EF4-FFF2-40B4-BE49-F238E27FC236}">
-                <a16:creationId xmlns:a16="http://schemas.microsoft.com/office/drawing/2014/main" id="{5767FCDA-9E92-BDD8-A35A-4277DF2999B0}"/>
+            <a:endParaRPr lang="en-US" dirty="0">
+              <a:latin typeface="Palatino Linotype" panose="02040502050505030304" pitchFamily="18" charset="0"/>
+            </a:endParaRPr>
+          </a:p>
+          <a:p>
+            <a:endParaRPr lang="de-DE" dirty="0">
+              <a:latin typeface="Palatino Linotype" panose="02040502050505030304" pitchFamily="18" charset="0"/>
+            </a:endParaRPr>
+          </a:p>
+        </p:txBody>
+      </p:sp>
+      <p:sp>
+        <p:nvSpPr>
+          <p:cNvPr id="4" name="Fußzeilenplatzhalter 3">
+            <a:extLst>
+              <a:ext uri="{FF2B5EF4-FFF2-40B4-BE49-F238E27FC236}">
+                <a16:creationId xmlns:a16="http://schemas.microsoft.com/office/drawing/2014/main" id="{5E169906-F933-69C9-AEA7-07330EEB1E00}"/>
               </a:ext>
             </a:extLst>
           </p:cNvPr>
@@ -4640,56 +4863,10 @@
           </a:p>
         </p:txBody>
       </p:sp>
-      <p:sp>
-        <p:nvSpPr>
-          <p:cNvPr id="8" name="Pfeil: nach rechts 7">
-            <a:extLst>
-              <a:ext uri="{FF2B5EF4-FFF2-40B4-BE49-F238E27FC236}">
-                <a16:creationId xmlns:a16="http://schemas.microsoft.com/office/drawing/2014/main" id="{4E3EBED9-4781-F661-4DE9-4AF5AFA39155}"/>
-              </a:ext>
-            </a:extLst>
-          </p:cNvPr>
-          <p:cNvSpPr/>
-          <p:nvPr/>
-        </p:nvSpPr>
-        <p:spPr>
-          <a:xfrm>
-            <a:off x="974785" y="5282271"/>
-            <a:ext cx="948906" cy="250166"/>
-          </a:xfrm>
-          <a:prstGeom prst="rightArrow">
-            <a:avLst/>
-          </a:prstGeom>
-        </p:spPr>
-        <p:style>
-          <a:lnRef idx="2">
-            <a:schemeClr val="accent1">
-              <a:shade val="15000"/>
-            </a:schemeClr>
-          </a:lnRef>
-          <a:fillRef idx="1">
-            <a:schemeClr val="accent1"/>
-          </a:fillRef>
-          <a:effectRef idx="0">
-            <a:schemeClr val="accent1"/>
-          </a:effectRef>
-          <a:fontRef idx="minor">
-            <a:schemeClr val="lt1"/>
-          </a:fontRef>
-        </p:style>
-        <p:txBody>
-          <a:bodyPr rtlCol="0" anchor="ctr"/>
-          <a:lstStyle/>
-          <a:p>
-            <a:pPr algn="ctr"/>
-            <a:endParaRPr lang="en-US"/>
-          </a:p>
-        </p:txBody>
-      </p:sp>
     </p:spTree>
     <p:extLst>
       <p:ext uri="{BB962C8B-B14F-4D97-AF65-F5344CB8AC3E}">
-        <p14:creationId xmlns:p14="http://schemas.microsoft.com/office/powerpoint/2010/main" val="2981172428"/>
+        <p14:creationId xmlns:p14="http://schemas.microsoft.com/office/powerpoint/2010/main" val="1475568040"/>
       </p:ext>
     </p:extLst>
   </p:cSld>
@@ -4721,7 +4898,7 @@
           <p:cNvPr id="2" name="Titel 1">
             <a:extLst>
               <a:ext uri="{FF2B5EF4-FFF2-40B4-BE49-F238E27FC236}">
-                <a16:creationId xmlns:a16="http://schemas.microsoft.com/office/drawing/2014/main" id="{4A022FB2-6150-D97D-DAEB-22C1A4C16264}"/>
+                <a16:creationId xmlns:a16="http://schemas.microsoft.com/office/drawing/2014/main" id="{2750D067-D1C5-B220-1393-8D45056040C0}"/>
               </a:ext>
             </a:extLst>
           </p:cNvPr>
@@ -4734,8 +4911,8 @@
         </p:nvSpPr>
         <p:spPr>
           <a:xfrm>
-            <a:off x="838200" y="-8626"/>
-            <a:ext cx="10515600" cy="1325563"/>
+            <a:off x="492000" y="0"/>
+            <a:ext cx="11700000" cy="1325563"/>
           </a:xfrm>
         </p:spPr>
         <p:txBody>
@@ -4745,46 +4922,62 @@
           <a:lstStyle/>
           <a:p>
             <a:r>
-              <a:rPr lang="de-DE" sz="3600" dirty="0"/>
-              <a:t>LLMs </a:t>
-            </a:r>
-            <a:r>
-              <a:rPr lang="de-DE" sz="3600" dirty="0" err="1"/>
-              <a:t>could</a:t>
-            </a:r>
-            <a:r>
-              <a:rPr lang="de-DE" sz="3600" dirty="0"/>
+              <a:rPr lang="de-DE" sz="3600" dirty="0" err="1">
+                <a:latin typeface="Century Gothic" panose="020B0502020202020204" pitchFamily="34" charset="0"/>
+              </a:rPr>
+              <a:t>Previous</a:t>
+            </a:r>
+            <a:r>
+              <a:rPr lang="de-DE" sz="3600" dirty="0">
+                <a:latin typeface="Century Gothic" panose="020B0502020202020204" pitchFamily="34" charset="0"/>
+              </a:rPr>
               <a:t> </a:t>
             </a:r>
             <a:r>
-              <a:rPr lang="de-DE" sz="3600" dirty="0" err="1"/>
-              <a:t>act</a:t>
-            </a:r>
-            <a:r>
-              <a:rPr lang="de-DE" sz="3600" dirty="0"/>
+              <a:rPr lang="de-DE" sz="3600" dirty="0" err="1">
+                <a:latin typeface="Century Gothic" panose="020B0502020202020204" pitchFamily="34" charset="0"/>
+              </a:rPr>
+              <a:t>empirical</a:t>
+            </a:r>
+            <a:r>
+              <a:rPr lang="de-DE" sz="3600" dirty="0">
+                <a:latin typeface="Century Gothic" panose="020B0502020202020204" pitchFamily="34" charset="0"/>
+              </a:rPr>
               <a:t> </a:t>
             </a:r>
             <a:r>
-              <a:rPr lang="de-DE" sz="3600" dirty="0" err="1"/>
-              <a:t>as</a:t>
-            </a:r>
-            <a:r>
-              <a:rPr lang="de-DE" sz="3600" dirty="0"/>
+              <a:rPr lang="de-DE" sz="3600" dirty="0" err="1">
+                <a:latin typeface="Century Gothic" panose="020B0502020202020204" pitchFamily="34" charset="0"/>
+              </a:rPr>
+              <a:t>findings</a:t>
+            </a:r>
+            <a:r>
+              <a:rPr lang="de-DE" sz="3600" dirty="0">
+                <a:latin typeface="Century Gothic" panose="020B0502020202020204" pitchFamily="34" charset="0"/>
+              </a:rPr>
               <a:t> </a:t>
             </a:r>
             <a:r>
-              <a:rPr lang="de-DE" sz="3600" dirty="0" err="1"/>
-              <a:t>surrogates</a:t>
-            </a:r>
-            <a:r>
-              <a:rPr lang="de-DE" sz="3600" dirty="0"/>
-              <a:t> in (market) </a:t>
-            </a:r>
-            <a:r>
-              <a:rPr lang="de-DE" sz="3600" dirty="0" err="1"/>
-              <a:t>research</a:t>
-            </a:r>
-            <a:endParaRPr lang="en-US" sz="3600" dirty="0"/>
+              <a:rPr lang="de-DE" sz="3600" dirty="0" err="1">
+                <a:latin typeface="Century Gothic" panose="020B0502020202020204" pitchFamily="34" charset="0"/>
+              </a:rPr>
+              <a:t>are</a:t>
+            </a:r>
+            <a:r>
+              <a:rPr lang="de-DE" sz="3600" dirty="0">
+                <a:latin typeface="Century Gothic" panose="020B0502020202020204" pitchFamily="34" charset="0"/>
+              </a:rPr>
+              <a:t> </a:t>
+            </a:r>
+            <a:r>
+              <a:rPr lang="de-DE" sz="3600" dirty="0" err="1">
+                <a:latin typeface="Century Gothic" panose="020B0502020202020204" pitchFamily="34" charset="0"/>
+              </a:rPr>
+              <a:t>ambiguous</a:t>
+            </a:r>
+            <a:endParaRPr lang="en-US" sz="3600" dirty="0">
+              <a:latin typeface="Century Gothic" panose="020B0502020202020204" pitchFamily="34" charset="0"/>
+            </a:endParaRPr>
           </a:p>
         </p:txBody>
       </p:sp>
@@ -4793,7 +4986,7 @@
           <p:cNvPr id="3" name="Inhaltsplatzhalter 2">
             <a:extLst>
               <a:ext uri="{FF2B5EF4-FFF2-40B4-BE49-F238E27FC236}">
-                <a16:creationId xmlns:a16="http://schemas.microsoft.com/office/drawing/2014/main" id="{7747FD6F-89DB-6912-D680-95CE4EB6D353}"/>
+                <a16:creationId xmlns:a16="http://schemas.microsoft.com/office/drawing/2014/main" id="{4943AEF8-A0B7-2DCB-27AB-3E839C3BB6FC}"/>
               </a:ext>
             </a:extLst>
           </p:cNvPr>
@@ -4806,239 +4999,583 @@
         </p:nvSpPr>
         <p:spPr>
           <a:xfrm>
-            <a:off x="838200" y="1316937"/>
+            <a:off x="838200" y="1343818"/>
             <a:ext cx="10515600" cy="4351338"/>
           </a:xfrm>
         </p:spPr>
         <p:txBody>
           <a:bodyPr>
-            <a:normAutofit fontScale="92500" lnSpcReduction="10000"/>
+            <a:normAutofit fontScale="92500"/>
           </a:bodyPr>
           <a:lstStyle/>
           <a:p>
             <a:r>
-              <a:rPr lang="de-DE" dirty="0"/>
+              <a:rPr lang="de-DE" dirty="0">
+                <a:latin typeface="Palatino Linotype" panose="02040502050505030304" pitchFamily="18" charset="0"/>
+              </a:rPr>
+              <a:t>Israeli et al. (07/2023) find, </a:t>
+            </a:r>
+            <a:r>
+              <a:rPr lang="de-DE" dirty="0" err="1">
+                <a:latin typeface="Palatino Linotype" panose="02040502050505030304" pitchFamily="18" charset="0"/>
+              </a:rPr>
+              <a:t>that</a:t>
+            </a:r>
+            <a:r>
+              <a:rPr lang="de-DE" dirty="0">
+                <a:latin typeface="Palatino Linotype" panose="02040502050505030304" pitchFamily="18" charset="0"/>
+              </a:rPr>
+              <a:t> GPT-3.5 </a:t>
+            </a:r>
+            <a:r>
+              <a:rPr lang="de-DE" dirty="0" err="1">
+                <a:latin typeface="Palatino Linotype" panose="02040502050505030304" pitchFamily="18" charset="0"/>
+              </a:rPr>
+              <a:t>responds</a:t>
+            </a:r>
+            <a:r>
+              <a:rPr lang="de-DE" dirty="0">
+                <a:latin typeface="Palatino Linotype" panose="02040502050505030304" pitchFamily="18" charset="0"/>
+              </a:rPr>
+              <a:t> in </a:t>
+            </a:r>
+            <a:r>
+              <a:rPr lang="de-DE" dirty="0" err="1">
+                <a:latin typeface="Palatino Linotype" panose="02040502050505030304" pitchFamily="18" charset="0"/>
+              </a:rPr>
+              <a:t>ways</a:t>
+            </a:r>
+            <a:r>
+              <a:rPr lang="de-DE" dirty="0">
+                <a:latin typeface="Palatino Linotype" panose="02040502050505030304" pitchFamily="18" charset="0"/>
+              </a:rPr>
+              <a:t> </a:t>
+            </a:r>
+            <a:r>
+              <a:rPr lang="de-DE" dirty="0" err="1">
+                <a:latin typeface="Palatino Linotype" panose="02040502050505030304" pitchFamily="18" charset="0"/>
+              </a:rPr>
+              <a:t>consistent</a:t>
+            </a:r>
+            <a:r>
+              <a:rPr lang="de-DE" dirty="0">
+                <a:latin typeface="Palatino Linotype" panose="02040502050505030304" pitchFamily="18" charset="0"/>
+              </a:rPr>
+              <a:t> </a:t>
+            </a:r>
+            <a:r>
+              <a:rPr lang="de-DE" dirty="0" err="1">
+                <a:latin typeface="Palatino Linotype" panose="02040502050505030304" pitchFamily="18" charset="0"/>
+              </a:rPr>
+              <a:t>with</a:t>
+            </a:r>
+            <a:r>
+              <a:rPr lang="de-DE" dirty="0">
+                <a:latin typeface="Palatino Linotype" panose="02040502050505030304" pitchFamily="18" charset="0"/>
+              </a:rPr>
+              <a:t> </a:t>
+            </a:r>
+            <a:r>
+              <a:rPr lang="de-DE" dirty="0" err="1">
+                <a:latin typeface="Palatino Linotype" panose="02040502050505030304" pitchFamily="18" charset="0"/>
+              </a:rPr>
+              <a:t>economic</a:t>
+            </a:r>
+            <a:r>
+              <a:rPr lang="de-DE" dirty="0">
+                <a:latin typeface="Palatino Linotype" panose="02040502050505030304" pitchFamily="18" charset="0"/>
+              </a:rPr>
+              <a:t> </a:t>
+            </a:r>
+            <a:r>
+              <a:rPr lang="de-DE" dirty="0" err="1">
+                <a:latin typeface="Palatino Linotype" panose="02040502050505030304" pitchFamily="18" charset="0"/>
+              </a:rPr>
+              <a:t>theory</a:t>
+            </a:r>
+            <a:r>
+              <a:rPr lang="de-DE" dirty="0">
+                <a:latin typeface="Palatino Linotype" panose="02040502050505030304" pitchFamily="18" charset="0"/>
+              </a:rPr>
+              <a:t> e.g. </a:t>
+            </a:r>
+            <a:r>
+              <a:rPr lang="de-DE" dirty="0" err="1">
+                <a:latin typeface="Palatino Linotype" panose="02040502050505030304" pitchFamily="18" charset="0"/>
+              </a:rPr>
+              <a:t>downward-sloping</a:t>
+            </a:r>
+            <a:r>
+              <a:rPr lang="de-DE" dirty="0">
+                <a:latin typeface="Palatino Linotype" panose="02040502050505030304" pitchFamily="18" charset="0"/>
+              </a:rPr>
+              <a:t> </a:t>
+            </a:r>
+            <a:r>
+              <a:rPr lang="de-DE" dirty="0" err="1">
+                <a:latin typeface="Palatino Linotype" panose="02040502050505030304" pitchFamily="18" charset="0"/>
+              </a:rPr>
+              <a:t>demand</a:t>
+            </a:r>
+            <a:r>
+              <a:rPr lang="de-DE" dirty="0">
+                <a:latin typeface="Palatino Linotype" panose="02040502050505030304" pitchFamily="18" charset="0"/>
+              </a:rPr>
+              <a:t> </a:t>
+            </a:r>
+            <a:r>
+              <a:rPr lang="de-DE" dirty="0" err="1">
+                <a:latin typeface="Palatino Linotype" panose="02040502050505030304" pitchFamily="18" charset="0"/>
+              </a:rPr>
+              <a:t>curve</a:t>
+            </a:r>
+            <a:endParaRPr lang="de-DE" dirty="0">
+              <a:latin typeface="Palatino Linotype" panose="02040502050505030304" pitchFamily="18" charset="0"/>
+            </a:endParaRPr>
+          </a:p>
+          <a:p>
+            <a:r>
+              <a:rPr lang="de-DE" dirty="0" err="1">
+                <a:latin typeface="Palatino Linotype" panose="02040502050505030304" pitchFamily="18" charset="0"/>
+              </a:rPr>
+              <a:t>Estimated</a:t>
+            </a:r>
+            <a:r>
+              <a:rPr lang="de-DE" dirty="0">
+                <a:latin typeface="Palatino Linotype" panose="02040502050505030304" pitchFamily="18" charset="0"/>
+              </a:rPr>
+              <a:t> WTP </a:t>
+            </a:r>
+            <a:r>
+              <a:rPr lang="de-DE" dirty="0" err="1">
+                <a:latin typeface="Palatino Linotype" panose="02040502050505030304" pitchFamily="18" charset="0"/>
+              </a:rPr>
+              <a:t>for</a:t>
+            </a:r>
+            <a:r>
+              <a:rPr lang="de-DE" dirty="0">
+                <a:latin typeface="Palatino Linotype" panose="02040502050505030304" pitchFamily="18" charset="0"/>
+              </a:rPr>
+              <a:t> </a:t>
+            </a:r>
+            <a:r>
+              <a:rPr lang="de-DE" dirty="0" err="1">
+                <a:latin typeface="Palatino Linotype" panose="02040502050505030304" pitchFamily="18" charset="0"/>
+              </a:rPr>
+              <a:t>products</a:t>
+            </a:r>
+            <a:r>
+              <a:rPr lang="de-DE" dirty="0">
+                <a:latin typeface="Palatino Linotype" panose="02040502050505030304" pitchFamily="18" charset="0"/>
+              </a:rPr>
+              <a:t> and </a:t>
+            </a:r>
+            <a:r>
+              <a:rPr lang="de-DE" dirty="0" err="1">
+                <a:latin typeface="Palatino Linotype" panose="02040502050505030304" pitchFamily="18" charset="0"/>
+              </a:rPr>
+              <a:t>features</a:t>
+            </a:r>
+            <a:r>
+              <a:rPr lang="de-DE" dirty="0">
+                <a:latin typeface="Palatino Linotype" panose="02040502050505030304" pitchFamily="18" charset="0"/>
+              </a:rPr>
+              <a:t> of </a:t>
+            </a:r>
+            <a:r>
+              <a:rPr lang="de-DE" dirty="0" err="1">
+                <a:latin typeface="Palatino Linotype" panose="02040502050505030304" pitchFamily="18" charset="0"/>
+              </a:rPr>
+              <a:t>realistic</a:t>
+            </a:r>
+            <a:r>
+              <a:rPr lang="de-DE" dirty="0">
+                <a:latin typeface="Palatino Linotype" panose="02040502050505030304" pitchFamily="18" charset="0"/>
+              </a:rPr>
+              <a:t> </a:t>
+            </a:r>
+            <a:r>
+              <a:rPr lang="de-DE" dirty="0" err="1">
+                <a:latin typeface="Palatino Linotype" panose="02040502050505030304" pitchFamily="18" charset="0"/>
+              </a:rPr>
+              <a:t>magnitude</a:t>
+            </a:r>
+            <a:endParaRPr lang="de-DE" dirty="0">
+              <a:latin typeface="Palatino Linotype" panose="02040502050505030304" pitchFamily="18" charset="0"/>
+            </a:endParaRPr>
+          </a:p>
+          <a:p>
+            <a:r>
+              <a:rPr lang="de-DE" dirty="0">
+                <a:latin typeface="Palatino Linotype" panose="02040502050505030304" pitchFamily="18" charset="0"/>
+              </a:rPr>
+              <a:t>Also: State-</a:t>
+            </a:r>
+            <a:r>
+              <a:rPr lang="de-DE" dirty="0" err="1">
+                <a:latin typeface="Palatino Linotype" panose="02040502050505030304" pitchFamily="18" charset="0"/>
+              </a:rPr>
+              <a:t>dependence</a:t>
+            </a:r>
+            <a:r>
+              <a:rPr lang="de-DE" dirty="0">
+                <a:latin typeface="Palatino Linotype" panose="02040502050505030304" pitchFamily="18" charset="0"/>
+              </a:rPr>
+              <a:t> and human-like </a:t>
+            </a:r>
+            <a:r>
+              <a:rPr lang="de-DE" dirty="0" err="1">
+                <a:latin typeface="Palatino Linotype" panose="02040502050505030304" pitchFamily="18" charset="0"/>
+              </a:rPr>
+              <a:t>order</a:t>
+            </a:r>
+            <a:r>
+              <a:rPr lang="de-DE" dirty="0">
+                <a:latin typeface="Palatino Linotype" panose="02040502050505030304" pitchFamily="18" charset="0"/>
+              </a:rPr>
+              <a:t> </a:t>
+            </a:r>
+            <a:r>
+              <a:rPr lang="de-DE" dirty="0" err="1">
+                <a:latin typeface="Palatino Linotype" panose="02040502050505030304" pitchFamily="18" charset="0"/>
+              </a:rPr>
+              <a:t>bias</a:t>
+            </a:r>
+            <a:r>
+              <a:rPr lang="de-DE" dirty="0">
+                <a:latin typeface="Palatino Linotype" panose="02040502050505030304" pitchFamily="18" charset="0"/>
+              </a:rPr>
+              <a:t> </a:t>
+            </a:r>
+          </a:p>
+          <a:p>
+            <a:r>
+              <a:rPr lang="de-DE" dirty="0">
+                <a:latin typeface="Palatino Linotype" panose="02040502050505030304" pitchFamily="18" charset="0"/>
+              </a:rPr>
+              <a:t>Dominguez-</a:t>
+            </a:r>
+            <a:r>
+              <a:rPr lang="de-DE" dirty="0" err="1">
+                <a:latin typeface="Palatino Linotype" panose="02040502050505030304" pitchFamily="18" charset="0"/>
+              </a:rPr>
+              <a:t>Olmedo</a:t>
+            </a:r>
+            <a:r>
+              <a:rPr lang="de-DE" dirty="0">
+                <a:latin typeface="Palatino Linotype" panose="02040502050505030304" pitchFamily="18" charset="0"/>
+              </a:rPr>
+              <a:t> et al. (10/2023) </a:t>
+            </a:r>
+            <a:r>
+              <a:rPr lang="de-DE" dirty="0" err="1">
+                <a:latin typeface="Palatino Linotype" panose="02040502050505030304" pitchFamily="18" charset="0"/>
+              </a:rPr>
+              <a:t>focus</a:t>
+            </a:r>
+            <a:r>
+              <a:rPr lang="de-DE" dirty="0">
+                <a:latin typeface="Palatino Linotype" panose="02040502050505030304" pitchFamily="18" charset="0"/>
+              </a:rPr>
+              <a:t> on </a:t>
+            </a:r>
+            <a:r>
+              <a:rPr lang="de-DE" dirty="0" err="1">
+                <a:latin typeface="Palatino Linotype" panose="02040502050505030304" pitchFamily="18" charset="0"/>
+              </a:rPr>
+              <a:t>survey</a:t>
+            </a:r>
+            <a:r>
+              <a:rPr lang="de-DE" dirty="0">
+                <a:latin typeface="Palatino Linotype" panose="02040502050505030304" pitchFamily="18" charset="0"/>
+              </a:rPr>
+              <a:t>-like </a:t>
+            </a:r>
+            <a:r>
+              <a:rPr lang="de-DE" dirty="0" err="1">
+                <a:latin typeface="Palatino Linotype" panose="02040502050505030304" pitchFamily="18" charset="0"/>
+              </a:rPr>
+              <a:t>requests</a:t>
+            </a:r>
+            <a:r>
+              <a:rPr lang="de-DE" dirty="0">
+                <a:latin typeface="Palatino Linotype" panose="02040502050505030304" pitchFamily="18" charset="0"/>
+              </a:rPr>
+              <a:t>:</a:t>
+            </a:r>
+          </a:p>
+          <a:p>
+            <a:r>
+              <a:rPr lang="de-DE" dirty="0">
+                <a:latin typeface="Palatino Linotype" panose="02040502050505030304" pitchFamily="18" charset="0"/>
+              </a:rPr>
               <a:t>Models </a:t>
             </a:r>
             <a:r>
-              <a:rPr lang="de-DE" dirty="0" err="1"/>
-              <a:t>trained</a:t>
-            </a:r>
-            <a:r>
-              <a:rPr lang="de-DE" dirty="0"/>
-              <a:t> on </a:t>
-            </a:r>
-            <a:r>
-              <a:rPr lang="de-DE" dirty="0" err="1"/>
-              <a:t>data</a:t>
-            </a:r>
-            <a:r>
-              <a:rPr lang="de-DE" dirty="0"/>
-              <a:t> from </a:t>
-            </a:r>
-            <a:r>
-              <a:rPr lang="de-DE" dirty="0" err="1"/>
+              <a:rPr lang="de-DE" dirty="0" err="1">
+                <a:latin typeface="Palatino Linotype" panose="02040502050505030304" pitchFamily="18" charset="0"/>
+              </a:rPr>
+              <a:t>exhibit</a:t>
+            </a:r>
+            <a:r>
+              <a:rPr lang="de-DE" dirty="0">
+                <a:latin typeface="Palatino Linotype" panose="02040502050505030304" pitchFamily="18" charset="0"/>
+              </a:rPr>
+              <a:t> </a:t>
+            </a:r>
+            <a:r>
+              <a:rPr lang="de-DE" dirty="0" err="1">
+                <a:latin typeface="Palatino Linotype" panose="02040502050505030304" pitchFamily="18" charset="0"/>
+              </a:rPr>
+              <a:t>considerable</a:t>
+            </a:r>
+            <a:r>
+              <a:rPr lang="de-DE" dirty="0">
+                <a:latin typeface="Palatino Linotype" panose="02040502050505030304" pitchFamily="18" charset="0"/>
+              </a:rPr>
+              <a:t> </a:t>
+            </a:r>
+            <a:r>
+              <a:rPr lang="de-DE" dirty="0" err="1">
+                <a:latin typeface="Palatino Linotype" panose="02040502050505030304" pitchFamily="18" charset="0"/>
+              </a:rPr>
+              <a:t>position</a:t>
+            </a:r>
+            <a:r>
+              <a:rPr lang="de-DE" dirty="0">
+                <a:latin typeface="Palatino Linotype" panose="02040502050505030304" pitchFamily="18" charset="0"/>
+              </a:rPr>
+              <a:t> and </a:t>
+            </a:r>
+            <a:r>
+              <a:rPr lang="de-DE" dirty="0" err="1">
+                <a:latin typeface="Palatino Linotype" panose="02040502050505030304" pitchFamily="18" charset="0"/>
+              </a:rPr>
+              <a:t>labeling</a:t>
+            </a:r>
+            <a:r>
+              <a:rPr lang="de-DE" dirty="0">
+                <a:latin typeface="Palatino Linotype" panose="02040502050505030304" pitchFamily="18" charset="0"/>
+              </a:rPr>
+              <a:t> </a:t>
+            </a:r>
+            <a:r>
+              <a:rPr lang="de-DE" dirty="0" err="1">
+                <a:latin typeface="Palatino Linotype" panose="02040502050505030304" pitchFamily="18" charset="0"/>
+              </a:rPr>
+              <a:t>biases</a:t>
+            </a:r>
+            <a:endParaRPr lang="de-DE" dirty="0">
+              <a:latin typeface="Palatino Linotype" panose="02040502050505030304" pitchFamily="18" charset="0"/>
+            </a:endParaRPr>
+          </a:p>
+          <a:p>
+            <a:r>
+              <a:rPr lang="de-DE" dirty="0" err="1">
+                <a:latin typeface="Palatino Linotype" panose="02040502050505030304" pitchFamily="18" charset="0"/>
+              </a:rPr>
+              <a:t>Once</a:t>
+            </a:r>
+            <a:r>
+              <a:rPr lang="de-DE" dirty="0">
+                <a:latin typeface="Palatino Linotype" panose="02040502050505030304" pitchFamily="18" charset="0"/>
+              </a:rPr>
+              <a:t> </a:t>
+            </a:r>
+            <a:r>
+              <a:rPr lang="de-DE" dirty="0" err="1">
+                <a:latin typeface="Palatino Linotype" panose="02040502050505030304" pitchFamily="18" charset="0"/>
+              </a:rPr>
+              <a:t>corrected</a:t>
+            </a:r>
+            <a:r>
+              <a:rPr lang="de-DE" dirty="0">
+                <a:latin typeface="Palatino Linotype" panose="02040502050505030304" pitchFamily="18" charset="0"/>
+              </a:rPr>
+              <a:t> </a:t>
+            </a:r>
+            <a:r>
+              <a:rPr lang="de-DE" dirty="0" err="1">
+                <a:latin typeface="Palatino Linotype" panose="02040502050505030304" pitchFamily="18" charset="0"/>
+              </a:rPr>
+              <a:t>for</a:t>
+            </a:r>
+            <a:r>
+              <a:rPr lang="de-DE" dirty="0">
+                <a:latin typeface="Palatino Linotype" panose="02040502050505030304" pitchFamily="18" charset="0"/>
+              </a:rPr>
+              <a:t> </a:t>
+            </a:r>
+            <a:r>
+              <a:rPr lang="de-DE" dirty="0" err="1">
+                <a:latin typeface="Palatino Linotype" panose="02040502050505030304" pitchFamily="18" charset="0"/>
+              </a:rPr>
+              <a:t>this</a:t>
+            </a:r>
+            <a:r>
+              <a:rPr lang="de-DE" dirty="0">
+                <a:latin typeface="Palatino Linotype" panose="02040502050505030304" pitchFamily="18" charset="0"/>
+              </a:rPr>
+              <a:t>, </a:t>
+            </a:r>
+            <a:r>
+              <a:rPr lang="de-DE" dirty="0" err="1">
+                <a:latin typeface="Palatino Linotype" panose="02040502050505030304" pitchFamily="18" charset="0"/>
+              </a:rPr>
+              <a:t>responses</a:t>
+            </a:r>
+            <a:r>
+              <a:rPr lang="de-DE" dirty="0">
+                <a:latin typeface="Palatino Linotype" panose="02040502050505030304" pitchFamily="18" charset="0"/>
+              </a:rPr>
+              <a:t> </a:t>
+            </a:r>
+            <a:r>
+              <a:rPr lang="de-DE" dirty="0" err="1">
+                <a:latin typeface="Palatino Linotype" panose="02040502050505030304" pitchFamily="18" charset="0"/>
+              </a:rPr>
+              <a:t>trend</a:t>
+            </a:r>
+            <a:r>
+              <a:rPr lang="de-DE" dirty="0">
+                <a:latin typeface="Palatino Linotype" panose="02040502050505030304" pitchFamily="18" charset="0"/>
+              </a:rPr>
+              <a:t> to uniform </a:t>
+            </a:r>
+            <a:r>
+              <a:rPr lang="de-DE" dirty="0" err="1">
+                <a:latin typeface="Palatino Linotype" panose="02040502050505030304" pitchFamily="18" charset="0"/>
+              </a:rPr>
+              <a:t>distribution</a:t>
+            </a:r>
+            <a:endParaRPr lang="de-DE" dirty="0">
+              <a:latin typeface="Palatino Linotype" panose="02040502050505030304" pitchFamily="18" charset="0"/>
+            </a:endParaRPr>
+          </a:p>
+          <a:p>
+            <a:pPr lvl="1"/>
+            <a:r>
+              <a:rPr lang="de-DE" dirty="0">
+                <a:latin typeface="Palatino Linotype" panose="02040502050505030304" pitchFamily="18" charset="0"/>
+              </a:rPr>
+              <a:t>Binary </a:t>
+            </a:r>
+            <a:r>
+              <a:rPr lang="de-DE" dirty="0" err="1">
+                <a:latin typeface="Palatino Linotype" panose="02040502050505030304" pitchFamily="18" charset="0"/>
+              </a:rPr>
+              <a:t>classifiers</a:t>
+            </a:r>
+            <a:r>
+              <a:rPr lang="de-DE" dirty="0">
+                <a:latin typeface="Palatino Linotype" panose="02040502050505030304" pitchFamily="18" charset="0"/>
+              </a:rPr>
+              <a:t> </a:t>
+            </a:r>
+            <a:r>
+              <a:rPr lang="de-DE" dirty="0" err="1">
+                <a:latin typeface="Palatino Linotype" panose="02040502050505030304" pitchFamily="18" charset="0"/>
+              </a:rPr>
+              <a:t>could</a:t>
+            </a:r>
+            <a:r>
+              <a:rPr lang="de-DE" dirty="0">
+                <a:latin typeface="Palatino Linotype" panose="02040502050505030304" pitchFamily="18" charset="0"/>
+              </a:rPr>
+              <a:t> </a:t>
+            </a:r>
+            <a:r>
+              <a:rPr lang="de-DE" dirty="0" err="1">
+                <a:latin typeface="Palatino Linotype" panose="02040502050505030304" pitchFamily="18" charset="0"/>
+              </a:rPr>
+              <a:t>almost</a:t>
+            </a:r>
+            <a:r>
+              <a:rPr lang="de-DE" dirty="0">
+                <a:latin typeface="Palatino Linotype" panose="02040502050505030304" pitchFamily="18" charset="0"/>
+              </a:rPr>
+              <a:t> </a:t>
+            </a:r>
+            <a:r>
+              <a:rPr lang="de-DE" dirty="0" err="1">
+                <a:latin typeface="Palatino Linotype" panose="02040502050505030304" pitchFamily="18" charset="0"/>
+              </a:rPr>
+              <a:t>always</a:t>
+            </a:r>
+            <a:r>
+              <a:rPr lang="de-DE" dirty="0">
+                <a:latin typeface="Palatino Linotype" panose="02040502050505030304" pitchFamily="18" charset="0"/>
+              </a:rPr>
+              <a:t> </a:t>
+            </a:r>
+            <a:r>
+              <a:rPr lang="de-DE" dirty="0" err="1">
+                <a:latin typeface="Palatino Linotype" panose="02040502050505030304" pitchFamily="18" charset="0"/>
+              </a:rPr>
+              <a:t>distinguish</a:t>
+            </a:r>
+            <a:r>
+              <a:rPr lang="de-DE" dirty="0">
+                <a:latin typeface="Palatino Linotype" panose="02040502050505030304" pitchFamily="18" charset="0"/>
+              </a:rPr>
+              <a:t> </a:t>
+            </a:r>
+            <a:r>
+              <a:rPr lang="de-DE" dirty="0" err="1">
+                <a:latin typeface="Palatino Linotype" panose="02040502050505030304" pitchFamily="18" charset="0"/>
+              </a:rPr>
+              <a:t>between</a:t>
+            </a:r>
+            <a:r>
+              <a:rPr lang="de-DE" dirty="0">
+                <a:latin typeface="Palatino Linotype" panose="02040502050505030304" pitchFamily="18" charset="0"/>
+              </a:rPr>
+              <a:t> a </a:t>
+            </a:r>
+            <a:r>
+              <a:rPr lang="de-DE" dirty="0" err="1">
+                <a:latin typeface="Palatino Linotype" panose="02040502050505030304" pitchFamily="18" charset="0"/>
+              </a:rPr>
+              <a:t>model‘s</a:t>
+            </a:r>
+            <a:r>
+              <a:rPr lang="de-DE" dirty="0">
+                <a:latin typeface="Palatino Linotype" panose="02040502050505030304" pitchFamily="18" charset="0"/>
+              </a:rPr>
+              <a:t> and real </a:t>
+            </a:r>
+            <a:r>
+              <a:rPr lang="de-DE" dirty="0" err="1">
+                <a:latin typeface="Palatino Linotype" panose="02040502050505030304" pitchFamily="18" charset="0"/>
+              </a:rPr>
+              <a:t>responses</a:t>
+            </a:r>
+            <a:r>
+              <a:rPr lang="de-DE" dirty="0">
+                <a:latin typeface="Palatino Linotype" panose="02040502050505030304" pitchFamily="18" charset="0"/>
+              </a:rPr>
+              <a:t> to </a:t>
+            </a:r>
+            <a:r>
+              <a:rPr lang="de-DE" dirty="0" err="1">
+                <a:latin typeface="Palatino Linotype" panose="02040502050505030304" pitchFamily="18" charset="0"/>
+              </a:rPr>
               <a:t>the</a:t>
             </a:r>
             <a:r>
-              <a:rPr lang="de-DE" dirty="0"/>
-              <a:t> </a:t>
-            </a:r>
-            <a:r>
-              <a:rPr lang="de-DE" dirty="0" err="1"/>
-              <a:t>internet</a:t>
-            </a:r>
-            <a:r>
-              <a:rPr lang="de-DE" dirty="0"/>
-              <a:t>, </a:t>
-            </a:r>
-            <a:r>
-              <a:rPr lang="de-DE" dirty="0" err="1"/>
-              <a:t>which</a:t>
-            </a:r>
-            <a:r>
-              <a:rPr lang="de-DE" dirty="0"/>
-              <a:t> </a:t>
-            </a:r>
-            <a:r>
-              <a:rPr lang="de-DE" dirty="0" err="1"/>
-              <a:t>might</a:t>
-            </a:r>
-            <a:r>
-              <a:rPr lang="de-DE" dirty="0"/>
-              <a:t> </a:t>
-            </a:r>
-            <a:r>
-              <a:rPr lang="de-DE" dirty="0" err="1"/>
-              <a:t>include</a:t>
-            </a:r>
-            <a:r>
-              <a:rPr lang="de-DE" dirty="0"/>
-              <a:t>:</a:t>
-            </a:r>
-            <a:r>
-              <a:rPr lang="en-US" dirty="0"/>
-              <a:t> Product reviews, messaging boards, brand forums, … </a:t>
-            </a:r>
-            <a:endParaRPr lang="de-DE" dirty="0"/>
-          </a:p>
-          <a:p>
-            <a:r>
-              <a:rPr lang="de-DE" dirty="0"/>
-              <a:t>Human </a:t>
-            </a:r>
-            <a:r>
-              <a:rPr lang="de-DE" dirty="0" err="1"/>
-              <a:t>individuals</a:t>
-            </a:r>
-            <a:r>
-              <a:rPr lang="de-DE" dirty="0"/>
-              <a:t> </a:t>
-            </a:r>
-            <a:r>
-              <a:rPr lang="de-DE" dirty="0" err="1"/>
-              <a:t>discuss</a:t>
-            </a:r>
-            <a:r>
-              <a:rPr lang="de-DE" dirty="0"/>
-              <a:t> </a:t>
-            </a:r>
-            <a:r>
-              <a:rPr lang="de-DE" dirty="0" err="1"/>
-              <a:t>consumer</a:t>
-            </a:r>
-            <a:r>
-              <a:rPr lang="de-DE" dirty="0"/>
-              <a:t> </a:t>
-            </a:r>
-            <a:r>
-              <a:rPr lang="de-DE" dirty="0" err="1"/>
-              <a:t>preferences</a:t>
-            </a:r>
-            <a:r>
-              <a:rPr lang="de-DE" dirty="0"/>
-              <a:t> online</a:t>
-            </a:r>
-          </a:p>
-          <a:p>
-            <a:pPr lvl="1"/>
-            <a:r>
-              <a:rPr lang="de-DE" dirty="0" err="1"/>
-              <a:t>Why</a:t>
-            </a:r>
-            <a:r>
-              <a:rPr lang="de-DE" dirty="0"/>
-              <a:t> </a:t>
-            </a:r>
-            <a:r>
-              <a:rPr lang="de-DE" dirty="0" err="1"/>
-              <a:t>did</a:t>
-            </a:r>
-            <a:r>
-              <a:rPr lang="de-DE" dirty="0"/>
-              <a:t> </a:t>
-            </a:r>
-            <a:r>
-              <a:rPr lang="de-DE" dirty="0" err="1"/>
-              <a:t>they</a:t>
-            </a:r>
-            <a:r>
-              <a:rPr lang="de-DE" dirty="0"/>
-              <a:t> (not) </a:t>
-            </a:r>
-            <a:r>
-              <a:rPr lang="de-DE" dirty="0" err="1"/>
-              <a:t>buy</a:t>
-            </a:r>
-            <a:r>
-              <a:rPr lang="de-DE" dirty="0"/>
-              <a:t> a </a:t>
-            </a:r>
-            <a:r>
-              <a:rPr lang="de-DE" dirty="0" err="1"/>
-              <a:t>product</a:t>
-            </a:r>
-            <a:r>
-              <a:rPr lang="de-DE" dirty="0"/>
-              <a:t>?</a:t>
-            </a:r>
-          </a:p>
-          <a:p>
-            <a:pPr lvl="1"/>
-            <a:r>
-              <a:rPr lang="de-DE" dirty="0" err="1"/>
-              <a:t>Why</a:t>
-            </a:r>
-            <a:r>
-              <a:rPr lang="de-DE" dirty="0"/>
-              <a:t> </a:t>
-            </a:r>
-            <a:r>
-              <a:rPr lang="de-DE" dirty="0" err="1"/>
-              <a:t>did</a:t>
-            </a:r>
-            <a:r>
-              <a:rPr lang="de-DE" dirty="0"/>
-              <a:t> </a:t>
-            </a:r>
-            <a:r>
-              <a:rPr lang="de-DE" dirty="0" err="1"/>
-              <a:t>they</a:t>
-            </a:r>
-            <a:r>
-              <a:rPr lang="de-DE" dirty="0"/>
-              <a:t> </a:t>
-            </a:r>
-            <a:r>
-              <a:rPr lang="de-DE" dirty="0" err="1"/>
-              <a:t>request</a:t>
-            </a:r>
-            <a:r>
-              <a:rPr lang="de-DE" dirty="0"/>
-              <a:t> a </a:t>
-            </a:r>
-            <a:r>
-              <a:rPr lang="de-DE" dirty="0" err="1"/>
-              <a:t>refund</a:t>
-            </a:r>
-            <a:r>
-              <a:rPr lang="de-DE" dirty="0"/>
-              <a:t>?</a:t>
-            </a:r>
-          </a:p>
-          <a:p>
-            <a:pPr lvl="1"/>
-            <a:r>
-              <a:rPr lang="en-US" dirty="0"/>
-              <a:t>Why did they prefer product A over product B? </a:t>
-            </a:r>
-          </a:p>
-          <a:p>
-            <a:r>
-              <a:rPr lang="en-US" dirty="0"/>
-              <a:t>If training data includes these discussions, we expect  the answers of LLM’s to reflect those preferences</a:t>
-            </a:r>
-          </a:p>
-          <a:p>
-            <a:r>
-              <a:rPr lang="en-US" dirty="0"/>
-              <a:t>Market research tools e.g. conjoint analysis or focus group discussions are expensive</a:t>
-            </a:r>
-          </a:p>
-          <a:p>
-            <a:r>
-              <a:rPr lang="en-US" dirty="0"/>
-              <a:t>LLM’s could serve as a fast and low-cost alternative</a:t>
+              <a:rPr lang="de-DE" dirty="0">
+                <a:latin typeface="Palatino Linotype" panose="02040502050505030304" pitchFamily="18" charset="0"/>
+              </a:rPr>
+              <a:t> ACS (American Community Survey)</a:t>
             </a:r>
           </a:p>
           <a:p>
             <a:pPr marL="0" indent="0">
               <a:buNone/>
             </a:pPr>
-            <a:endParaRPr lang="en-US" dirty="0"/>
-          </a:p>
-          <a:p>
-            <a:endParaRPr lang="de-DE" dirty="0"/>
+            <a:endParaRPr lang="de-DE" dirty="0">
+              <a:latin typeface="Palatino Linotype" panose="02040502050505030304" pitchFamily="18" charset="0"/>
+            </a:endParaRPr>
           </a:p>
         </p:txBody>
       </p:sp>
@@ -5047,7 +5584,7 @@
           <p:cNvPr id="4" name="Fußzeilenplatzhalter 3">
             <a:extLst>
               <a:ext uri="{FF2B5EF4-FFF2-40B4-BE49-F238E27FC236}">
-                <a16:creationId xmlns:a16="http://schemas.microsoft.com/office/drawing/2014/main" id="{5E169906-F933-69C9-AEA7-07330EEB1E00}"/>
+                <a16:creationId xmlns:a16="http://schemas.microsoft.com/office/drawing/2014/main" id="{6AA01806-E4A3-60D9-6DDF-F4BB2433BB26}"/>
               </a:ext>
             </a:extLst>
           </p:cNvPr>
@@ -5060,7 +5597,7 @@
         </p:nvSpPr>
         <p:spPr>
           <a:xfrm>
-            <a:off x="0" y="6492875"/>
+            <a:off x="0" y="6474620"/>
             <a:ext cx="12192000" cy="365125"/>
           </a:xfrm>
         </p:spPr>
@@ -5070,6 +5607,22 @@
           <a:p>
             <a:pPr algn="l"/>
             <a:r>
+              <a:rPr lang="en-US" i="1" dirty="0"/>
+              <a:t>Dominguez-Olmedo, R., Hardt, M., &amp; Mendler-Dunner, C. (2023). Questioning the Survey Responses of Large Language Models. </a:t>
+            </a:r>
+            <a:r>
+              <a:rPr lang="en-US" i="1" dirty="0" err="1"/>
+              <a:t>ArXiv</a:t>
+            </a:r>
+            <a:r>
+              <a:rPr lang="en-US" i="1" dirty="0"/>
+              <a:t>, abs/2306.07951.</a:t>
+            </a:r>
+            <a:endParaRPr lang="en-US" dirty="0"/>
+          </a:p>
+          <a:p>
+            <a:pPr algn="l"/>
+            <a:r>
               <a:rPr lang="en-US" dirty="0"/>
               <a:t>Brand, James and Israeli, Ayelet and Ngwe, Donald, Using GPT for Market Research (March 21, 2023). Harvard Business School Marketing Unit Working Paper No. 23-062</a:t>
             </a:r>
@@ -5079,7 +5632,7 @@
     </p:spTree>
     <p:extLst>
       <p:ext uri="{BB962C8B-B14F-4D97-AF65-F5344CB8AC3E}">
-        <p14:creationId xmlns:p14="http://schemas.microsoft.com/office/powerpoint/2010/main" val="1475568040"/>
+        <p14:creationId xmlns:p14="http://schemas.microsoft.com/office/powerpoint/2010/main" val="1274610509"/>
       </p:ext>
     </p:extLst>
   </p:cSld>
@@ -5111,7 +5664,7 @@
           <p:cNvPr id="2" name="Titel 1">
             <a:extLst>
               <a:ext uri="{FF2B5EF4-FFF2-40B4-BE49-F238E27FC236}">
-                <a16:creationId xmlns:a16="http://schemas.microsoft.com/office/drawing/2014/main" id="{2750D067-D1C5-B220-1393-8D45056040C0}"/>
+                <a16:creationId xmlns:a16="http://schemas.microsoft.com/office/drawing/2014/main" id="{ACDE1556-20ED-1289-2C1E-B46CF7287C22}"/>
               </a:ext>
             </a:extLst>
           </p:cNvPr>
@@ -5124,8 +5677,8 @@
         </p:nvSpPr>
         <p:spPr>
           <a:xfrm>
-            <a:off x="838200" y="18255"/>
-            <a:ext cx="10515600" cy="1325563"/>
+            <a:off x="492000" y="0"/>
+            <a:ext cx="11700000" cy="1343818"/>
           </a:xfrm>
         </p:spPr>
         <p:txBody>
@@ -5135,42 +5688,32 @@
           <a:lstStyle/>
           <a:p>
             <a:r>
-              <a:rPr lang="de-DE" sz="3600" dirty="0" err="1"/>
-              <a:t>Previous</a:t>
-            </a:r>
-            <a:r>
-              <a:rPr lang="de-DE" sz="3600" dirty="0"/>
-              <a:t> </a:t>
-            </a:r>
-            <a:r>
-              <a:rPr lang="de-DE" sz="3600" dirty="0" err="1"/>
-              <a:t>empirical</a:t>
-            </a:r>
-            <a:r>
-              <a:rPr lang="de-DE" sz="3600" dirty="0"/>
-              <a:t> </a:t>
-            </a:r>
-            <a:r>
-              <a:rPr lang="de-DE" sz="3600" dirty="0" err="1"/>
-              <a:t>findings</a:t>
-            </a:r>
-            <a:r>
-              <a:rPr lang="de-DE" sz="3600" dirty="0"/>
-              <a:t> </a:t>
-            </a:r>
-            <a:r>
-              <a:rPr lang="de-DE" sz="3600" dirty="0" err="1"/>
-              <a:t>are</a:t>
-            </a:r>
-            <a:r>
-              <a:rPr lang="de-DE" sz="3600" dirty="0"/>
-              <a:t> </a:t>
-            </a:r>
-            <a:r>
-              <a:rPr lang="de-DE" sz="3600" dirty="0" err="1"/>
-              <a:t>ambiguous</a:t>
-            </a:r>
-            <a:endParaRPr lang="en-US" sz="3600" dirty="0"/>
+              <a:rPr lang="de-DE" sz="3600" dirty="0">
+                <a:latin typeface="Century Gothic" panose="020B0502020202020204" pitchFamily="34" charset="0"/>
+              </a:rPr>
+              <a:t>Research </a:t>
+            </a:r>
+            <a:r>
+              <a:rPr lang="de-DE" sz="3600" dirty="0" err="1">
+                <a:latin typeface="Century Gothic" panose="020B0502020202020204" pitchFamily="34" charset="0"/>
+              </a:rPr>
+              <a:t>approach</a:t>
+            </a:r>
+            <a:r>
+              <a:rPr lang="de-DE" sz="3600" dirty="0">
+                <a:latin typeface="Century Gothic" panose="020B0502020202020204" pitchFamily="34" charset="0"/>
+              </a:rPr>
+              <a:t> so </a:t>
+            </a:r>
+            <a:r>
+              <a:rPr lang="de-DE" sz="3600" dirty="0" err="1">
+                <a:latin typeface="Century Gothic" panose="020B0502020202020204" pitchFamily="34" charset="0"/>
+              </a:rPr>
+              <a:t>far</a:t>
+            </a:r>
+            <a:endParaRPr lang="en-US" sz="3600" dirty="0">
+              <a:latin typeface="Century Gothic" panose="020B0502020202020204" pitchFamily="34" charset="0"/>
+            </a:endParaRPr>
           </a:p>
         </p:txBody>
       </p:sp>
@@ -5179,7 +5722,7 @@
           <p:cNvPr id="3" name="Inhaltsplatzhalter 2">
             <a:extLst>
               <a:ext uri="{FF2B5EF4-FFF2-40B4-BE49-F238E27FC236}">
-                <a16:creationId xmlns:a16="http://schemas.microsoft.com/office/drawing/2014/main" id="{4943AEF8-A0B7-2DCB-27AB-3E839C3BB6FC}"/>
+                <a16:creationId xmlns:a16="http://schemas.microsoft.com/office/drawing/2014/main" id="{A55AD18F-785E-E109-A2DC-BEA7782CD98A}"/>
               </a:ext>
             </a:extLst>
           </p:cNvPr>
@@ -5198,887 +5741,509 @@
         </p:spPr>
         <p:txBody>
           <a:bodyPr>
-            <a:normAutofit/>
+            <a:normAutofit fontScale="92500" lnSpcReduction="20000"/>
           </a:bodyPr>
           <a:lstStyle/>
           <a:p>
             <a:r>
-              <a:rPr lang="de-DE" dirty="0"/>
-              <a:t>Israeli et al. (07/2023) find, </a:t>
-            </a:r>
-            <a:r>
-              <a:rPr lang="de-DE" dirty="0" err="1"/>
-              <a:t>that</a:t>
-            </a:r>
-            <a:r>
-              <a:rPr lang="de-DE" dirty="0"/>
-              <a:t> GPT-3.5 </a:t>
-            </a:r>
-            <a:r>
-              <a:rPr lang="de-DE" dirty="0" err="1"/>
-              <a:t>responds</a:t>
-            </a:r>
-            <a:r>
-              <a:rPr lang="de-DE" dirty="0"/>
+              <a:rPr lang="de-DE" dirty="0" err="1">
+                <a:latin typeface="Palatino Linotype" panose="02040502050505030304" pitchFamily="18" charset="0"/>
+              </a:rPr>
+              <a:t>Three</a:t>
+            </a:r>
+            <a:r>
+              <a:rPr lang="de-DE" dirty="0">
+                <a:latin typeface="Palatino Linotype" panose="02040502050505030304" pitchFamily="18" charset="0"/>
+              </a:rPr>
+              <a:t> </a:t>
+            </a:r>
+            <a:r>
+              <a:rPr lang="de-DE" dirty="0" err="1">
+                <a:latin typeface="Palatino Linotype" panose="02040502050505030304" pitchFamily="18" charset="0"/>
+              </a:rPr>
+              <a:t>models</a:t>
+            </a:r>
+            <a:r>
+              <a:rPr lang="de-DE" dirty="0">
+                <a:latin typeface="Palatino Linotype" panose="02040502050505030304" pitchFamily="18" charset="0"/>
+              </a:rPr>
+              <a:t>: </a:t>
+            </a:r>
+            <a:r>
+              <a:rPr lang="de-DE" dirty="0" err="1">
+                <a:latin typeface="Palatino Linotype" panose="02040502050505030304" pitchFamily="18" charset="0"/>
+              </a:rPr>
+              <a:t>Openai‘s</a:t>
+            </a:r>
+            <a:r>
+              <a:rPr lang="de-DE" dirty="0">
+                <a:latin typeface="Palatino Linotype" panose="02040502050505030304" pitchFamily="18" charset="0"/>
+              </a:rPr>
+              <a:t> GPT-3.5 &amp; GPT-4, </a:t>
+            </a:r>
+            <a:r>
+              <a:rPr lang="de-DE" dirty="0" err="1">
+                <a:latin typeface="Palatino Linotype" panose="02040502050505030304" pitchFamily="18" charset="0"/>
+              </a:rPr>
+              <a:t>Meta‘s</a:t>
+            </a:r>
+            <a:r>
+              <a:rPr lang="de-DE" dirty="0">
+                <a:latin typeface="Palatino Linotype" panose="02040502050505030304" pitchFamily="18" charset="0"/>
+              </a:rPr>
+              <a:t> Llama-2-70b</a:t>
+            </a:r>
+          </a:p>
+          <a:p>
+            <a:r>
+              <a:rPr lang="de-DE" dirty="0">
+                <a:latin typeface="Palatino Linotype" panose="02040502050505030304" pitchFamily="18" charset="0"/>
+              </a:rPr>
+              <a:t>Access </a:t>
+            </a:r>
+            <a:r>
+              <a:rPr lang="de-DE" dirty="0" err="1">
+                <a:latin typeface="Palatino Linotype" panose="02040502050505030304" pitchFamily="18" charset="0"/>
+              </a:rPr>
+              <a:t>through</a:t>
+            </a:r>
+            <a:r>
+              <a:rPr lang="de-DE" dirty="0">
+                <a:latin typeface="Palatino Linotype" panose="02040502050505030304" pitchFamily="18" charset="0"/>
+              </a:rPr>
+              <a:t> API and </a:t>
+            </a:r>
+            <a:r>
+              <a:rPr lang="de-DE" dirty="0" err="1">
+                <a:latin typeface="Palatino Linotype" panose="02040502050505030304" pitchFamily="18" charset="0"/>
+              </a:rPr>
+              <a:t>issue</a:t>
+            </a:r>
+            <a:r>
+              <a:rPr lang="de-DE" dirty="0">
+                <a:latin typeface="Palatino Linotype" panose="02040502050505030304" pitchFamily="18" charset="0"/>
+              </a:rPr>
+              <a:t> </a:t>
+            </a:r>
+            <a:r>
+              <a:rPr lang="de-DE" dirty="0" err="1">
+                <a:latin typeface="Palatino Linotype" panose="02040502050505030304" pitchFamily="18" charset="0"/>
+              </a:rPr>
+              <a:t>thousands</a:t>
+            </a:r>
+            <a:r>
+              <a:rPr lang="de-DE" dirty="0">
+                <a:latin typeface="Palatino Linotype" panose="02040502050505030304" pitchFamily="18" charset="0"/>
+              </a:rPr>
+              <a:t> of </a:t>
+            </a:r>
+            <a:r>
+              <a:rPr lang="de-DE" dirty="0" err="1">
+                <a:latin typeface="Palatino Linotype" panose="02040502050505030304" pitchFamily="18" charset="0"/>
+              </a:rPr>
+              <a:t>requests</a:t>
+            </a:r>
+            <a:r>
+              <a:rPr lang="de-DE" dirty="0">
+                <a:latin typeface="Palatino Linotype" panose="02040502050505030304" pitchFamily="18" charset="0"/>
+              </a:rPr>
+              <a:t>, </a:t>
+            </a:r>
+            <a:r>
+              <a:rPr lang="de-DE" dirty="0" err="1">
+                <a:latin typeface="Palatino Linotype" panose="02040502050505030304" pitchFamily="18" charset="0"/>
+              </a:rPr>
+              <a:t>focussing</a:t>
+            </a:r>
+            <a:r>
+              <a:rPr lang="de-DE" dirty="0">
+                <a:latin typeface="Palatino Linotype" panose="02040502050505030304" pitchFamily="18" charset="0"/>
+              </a:rPr>
+              <a:t> on distributional </a:t>
+            </a:r>
+            <a:r>
+              <a:rPr lang="de-DE" dirty="0" err="1">
+                <a:latin typeface="Palatino Linotype" panose="02040502050505030304" pitchFamily="18" charset="0"/>
+              </a:rPr>
+              <a:t>nature</a:t>
+            </a:r>
+            <a:r>
+              <a:rPr lang="de-DE" dirty="0">
+                <a:latin typeface="Palatino Linotype" panose="02040502050505030304" pitchFamily="18" charset="0"/>
+              </a:rPr>
+              <a:t> of </a:t>
+            </a:r>
+            <a:r>
+              <a:rPr lang="de-DE" dirty="0" err="1">
+                <a:latin typeface="Palatino Linotype" panose="02040502050505030304" pitchFamily="18" charset="0"/>
+              </a:rPr>
+              <a:t>model</a:t>
+            </a:r>
+            <a:r>
+              <a:rPr lang="de-DE" dirty="0">
+                <a:latin typeface="Palatino Linotype" panose="02040502050505030304" pitchFamily="18" charset="0"/>
+              </a:rPr>
+              <a:t> </a:t>
+            </a:r>
+            <a:r>
+              <a:rPr lang="de-DE" dirty="0" err="1">
+                <a:latin typeface="Palatino Linotype" panose="02040502050505030304" pitchFamily="18" charset="0"/>
+              </a:rPr>
+              <a:t>responses</a:t>
+            </a:r>
+            <a:endParaRPr lang="de-DE" dirty="0">
+              <a:latin typeface="Palatino Linotype" panose="02040502050505030304" pitchFamily="18" charset="0"/>
+            </a:endParaRPr>
+          </a:p>
+          <a:p>
+            <a:r>
+              <a:rPr lang="de-DE" dirty="0">
+                <a:latin typeface="Palatino Linotype" panose="02040502050505030304" pitchFamily="18" charset="0"/>
+              </a:rPr>
+              <a:t>Special </a:t>
+            </a:r>
+            <a:r>
+              <a:rPr lang="de-DE" dirty="0" err="1">
+                <a:latin typeface="Palatino Linotype" panose="02040502050505030304" pitchFamily="18" charset="0"/>
+              </a:rPr>
+              <a:t>focus</a:t>
+            </a:r>
+            <a:r>
+              <a:rPr lang="de-DE" dirty="0">
+                <a:latin typeface="Palatino Linotype" panose="02040502050505030304" pitchFamily="18" charset="0"/>
+              </a:rPr>
+              <a:t> on „</a:t>
+            </a:r>
+            <a:r>
+              <a:rPr lang="de-DE" dirty="0" err="1">
+                <a:latin typeface="Palatino Linotype" panose="02040502050505030304" pitchFamily="18" charset="0"/>
+              </a:rPr>
+              <a:t>temperature</a:t>
+            </a:r>
+            <a:r>
+              <a:rPr lang="de-DE" dirty="0">
+                <a:latin typeface="Palatino Linotype" panose="02040502050505030304" pitchFamily="18" charset="0"/>
+              </a:rPr>
+              <a:t>“-parameter </a:t>
+            </a:r>
+          </a:p>
+          <a:p>
+            <a:pPr lvl="1"/>
+            <a:r>
+              <a:rPr lang="de-DE" dirty="0" err="1">
+                <a:latin typeface="Palatino Linotype" panose="02040502050505030304" pitchFamily="18" charset="0"/>
+              </a:rPr>
+              <a:t>Probability</a:t>
+            </a:r>
+            <a:r>
+              <a:rPr lang="de-DE" dirty="0">
+                <a:latin typeface="Palatino Linotype" panose="02040502050505030304" pitchFamily="18" charset="0"/>
+              </a:rPr>
+              <a:t> of </a:t>
+            </a:r>
+            <a:r>
+              <a:rPr lang="de-DE" dirty="0" err="1">
+                <a:latin typeface="Palatino Linotype" panose="02040502050505030304" pitchFamily="18" charset="0"/>
+              </a:rPr>
+              <a:t>choosing</a:t>
+            </a:r>
+            <a:r>
+              <a:rPr lang="de-DE" dirty="0">
+                <a:latin typeface="Palatino Linotype" panose="02040502050505030304" pitchFamily="18" charset="0"/>
+              </a:rPr>
+              <a:t> a </a:t>
+            </a:r>
+            <a:r>
+              <a:rPr lang="de-DE" dirty="0" err="1">
+                <a:latin typeface="Palatino Linotype" panose="02040502050505030304" pitchFamily="18" charset="0"/>
+              </a:rPr>
+              <a:t>less</a:t>
+            </a:r>
+            <a:r>
+              <a:rPr lang="de-DE" dirty="0">
+                <a:latin typeface="Palatino Linotype" panose="02040502050505030304" pitchFamily="18" charset="0"/>
+              </a:rPr>
+              <a:t> </a:t>
+            </a:r>
+            <a:r>
+              <a:rPr lang="de-DE" dirty="0" err="1">
+                <a:latin typeface="Palatino Linotype" panose="02040502050505030304" pitchFamily="18" charset="0"/>
+              </a:rPr>
+              <a:t>likely</a:t>
+            </a:r>
+            <a:r>
+              <a:rPr lang="de-DE" dirty="0">
+                <a:latin typeface="Palatino Linotype" panose="02040502050505030304" pitchFamily="18" charset="0"/>
+              </a:rPr>
+              <a:t> </a:t>
+            </a:r>
+            <a:r>
+              <a:rPr lang="de-DE" dirty="0" err="1">
+                <a:latin typeface="Palatino Linotype" panose="02040502050505030304" pitchFamily="18" charset="0"/>
+              </a:rPr>
+              <a:t>token</a:t>
+            </a:r>
+            <a:r>
+              <a:rPr lang="de-DE" dirty="0">
+                <a:latin typeface="Palatino Linotype" panose="02040502050505030304" pitchFamily="18" charset="0"/>
+              </a:rPr>
+              <a:t> </a:t>
+            </a:r>
+          </a:p>
+          <a:p>
+            <a:pPr lvl="1"/>
+            <a:r>
+              <a:rPr lang="de-DE" dirty="0">
+                <a:latin typeface="Palatino Linotype" panose="02040502050505030304" pitchFamily="18" charset="0"/>
+              </a:rPr>
+              <a:t>0 </a:t>
+            </a:r>
+            <a:r>
+              <a:rPr lang="de-DE" dirty="0" err="1">
+                <a:latin typeface="Palatino Linotype" panose="02040502050505030304" pitchFamily="18" charset="0"/>
+              </a:rPr>
+              <a:t>for</a:t>
+            </a:r>
+            <a:r>
+              <a:rPr lang="de-DE" dirty="0">
+                <a:latin typeface="Palatino Linotype" panose="02040502050505030304" pitchFamily="18" charset="0"/>
+              </a:rPr>
+              <a:t> </a:t>
+            </a:r>
+            <a:r>
+              <a:rPr lang="de-DE" dirty="0" err="1">
+                <a:latin typeface="Palatino Linotype" panose="02040502050505030304" pitchFamily="18" charset="0"/>
+              </a:rPr>
+              <a:t>deterministic</a:t>
+            </a:r>
+            <a:r>
+              <a:rPr lang="de-DE" dirty="0">
+                <a:latin typeface="Palatino Linotype" panose="02040502050505030304" pitchFamily="18" charset="0"/>
+              </a:rPr>
+              <a:t> </a:t>
+            </a:r>
+            <a:r>
+              <a:rPr lang="de-DE" dirty="0" err="1">
+                <a:latin typeface="Palatino Linotype" panose="02040502050505030304" pitchFamily="18" charset="0"/>
+              </a:rPr>
+              <a:t>outcome</a:t>
+            </a:r>
+            <a:r>
+              <a:rPr lang="de-DE" dirty="0">
+                <a:latin typeface="Palatino Linotype" panose="02040502050505030304" pitchFamily="18" charset="0"/>
+              </a:rPr>
+              <a:t>, </a:t>
+            </a:r>
+            <a:r>
+              <a:rPr lang="de-DE" dirty="0" err="1">
+                <a:latin typeface="Palatino Linotype" panose="02040502050505030304" pitchFamily="18" charset="0"/>
+              </a:rPr>
+              <a:t>higher</a:t>
+            </a:r>
+            <a:r>
+              <a:rPr lang="de-DE" dirty="0">
+                <a:latin typeface="Palatino Linotype" panose="02040502050505030304" pitchFamily="18" charset="0"/>
+              </a:rPr>
+              <a:t> values </a:t>
+            </a:r>
+            <a:r>
+              <a:rPr lang="de-DE" dirty="0" err="1">
+                <a:latin typeface="Palatino Linotype" panose="02040502050505030304" pitchFamily="18" charset="0"/>
+              </a:rPr>
+              <a:t>induce</a:t>
+            </a:r>
+            <a:r>
+              <a:rPr lang="de-DE" dirty="0">
+                <a:latin typeface="Palatino Linotype" panose="02040502050505030304" pitchFamily="18" charset="0"/>
+              </a:rPr>
+              <a:t> </a:t>
+            </a:r>
+            <a:r>
+              <a:rPr lang="de-DE" dirty="0" err="1">
+                <a:latin typeface="Palatino Linotype" panose="02040502050505030304" pitchFamily="18" charset="0"/>
+              </a:rPr>
+              <a:t>randomness</a:t>
+            </a:r>
+            <a:r>
+              <a:rPr lang="de-DE" dirty="0">
+                <a:latin typeface="Palatino Linotype" panose="02040502050505030304" pitchFamily="18" charset="0"/>
+              </a:rPr>
               <a:t> in </a:t>
             </a:r>
             <a:r>
-              <a:rPr lang="de-DE" dirty="0" err="1"/>
-              <a:t>ways</a:t>
-            </a:r>
-            <a:r>
-              <a:rPr lang="de-DE" dirty="0"/>
+              <a:rPr lang="de-DE" dirty="0" err="1">
+                <a:latin typeface="Palatino Linotype" panose="02040502050505030304" pitchFamily="18" charset="0"/>
+              </a:rPr>
+              <a:t>response</a:t>
+            </a:r>
+            <a:endParaRPr lang="de-DE" dirty="0">
+              <a:latin typeface="Palatino Linotype" panose="02040502050505030304" pitchFamily="18" charset="0"/>
+            </a:endParaRPr>
+          </a:p>
+          <a:p>
+            <a:r>
+              <a:rPr lang="de-DE" dirty="0" err="1">
+                <a:latin typeface="Palatino Linotype" panose="02040502050505030304" pitchFamily="18" charset="0"/>
+              </a:rPr>
+              <a:t>Recreating</a:t>
+            </a:r>
+            <a:r>
+              <a:rPr lang="de-DE" dirty="0">
+                <a:latin typeface="Palatino Linotype" panose="02040502050505030304" pitchFamily="18" charset="0"/>
+              </a:rPr>
               <a:t> </a:t>
             </a:r>
             <a:r>
-              <a:rPr lang="de-DE" dirty="0" err="1"/>
-              <a:t>consistent</a:t>
-            </a:r>
-            <a:r>
-              <a:rPr lang="de-DE" dirty="0"/>
+              <a:rPr lang="de-DE" dirty="0" err="1">
+                <a:latin typeface="Palatino Linotype" panose="02040502050505030304" pitchFamily="18" charset="0"/>
+              </a:rPr>
+              <a:t>typical</a:t>
+            </a:r>
+            <a:r>
+              <a:rPr lang="de-DE" dirty="0">
+                <a:latin typeface="Palatino Linotype" panose="02040502050505030304" pitchFamily="18" charset="0"/>
+              </a:rPr>
               <a:t> </a:t>
             </a:r>
             <a:r>
-              <a:rPr lang="de-DE" dirty="0" err="1"/>
-              <a:t>with</a:t>
-            </a:r>
-            <a:r>
-              <a:rPr lang="de-DE" dirty="0"/>
+              <a:rPr lang="de-DE" dirty="0" err="1">
+                <a:latin typeface="Palatino Linotype" panose="02040502050505030304" pitchFamily="18" charset="0"/>
+              </a:rPr>
+              <a:t>consumer</a:t>
+            </a:r>
+            <a:r>
+              <a:rPr lang="de-DE" dirty="0">
+                <a:latin typeface="Palatino Linotype" panose="02040502050505030304" pitchFamily="18" charset="0"/>
+              </a:rPr>
               <a:t> </a:t>
             </a:r>
             <a:r>
-              <a:rPr lang="de-DE" dirty="0" err="1"/>
-              <a:t>economic</a:t>
-            </a:r>
-            <a:r>
-              <a:rPr lang="de-DE" dirty="0"/>
+              <a:rPr lang="de-DE" dirty="0" err="1">
+                <a:latin typeface="Palatino Linotype" panose="02040502050505030304" pitchFamily="18" charset="0"/>
+              </a:rPr>
+              <a:t>behavior</a:t>
+            </a:r>
+            <a:r>
+              <a:rPr lang="de-DE" dirty="0">
+                <a:latin typeface="Palatino Linotype" panose="02040502050505030304" pitchFamily="18" charset="0"/>
+              </a:rPr>
               <a:t> </a:t>
             </a:r>
             <a:r>
-              <a:rPr lang="de-DE" dirty="0" err="1"/>
+              <a:rPr lang="de-DE" dirty="0" err="1">
+                <a:latin typeface="Palatino Linotype" panose="02040502050505030304" pitchFamily="18" charset="0"/>
+              </a:rPr>
+              <a:t>patterns</a:t>
+            </a:r>
+            <a:r>
+              <a:rPr lang="de-DE" dirty="0">
+                <a:latin typeface="Palatino Linotype" panose="02040502050505030304" pitchFamily="18" charset="0"/>
+              </a:rPr>
+              <a:t> via:</a:t>
+            </a:r>
+          </a:p>
+          <a:p>
+            <a:pPr lvl="1"/>
+            <a:r>
+              <a:rPr lang="de-DE" dirty="0">
+                <a:latin typeface="Palatino Linotype" panose="02040502050505030304" pitchFamily="18" charset="0"/>
+              </a:rPr>
+              <a:t>Prospect </a:t>
+            </a:r>
+            <a:r>
+              <a:rPr lang="de-DE" dirty="0" err="1">
+                <a:latin typeface="Palatino Linotype" panose="02040502050505030304" pitchFamily="18" charset="0"/>
+              </a:rPr>
               <a:t>theory</a:t>
             </a:r>
-            <a:r>
-              <a:rPr lang="de-DE" dirty="0"/>
-              <a:t> e.g. </a:t>
-            </a:r>
-            <a:r>
-              <a:rPr lang="de-DE" dirty="0" err="1"/>
-              <a:t>downward-sloping</a:t>
-            </a:r>
-            <a:r>
-              <a:rPr lang="de-DE" dirty="0"/>
+            <a:endParaRPr lang="de-DE" dirty="0">
+              <a:latin typeface="Palatino Linotype" panose="02040502050505030304" pitchFamily="18" charset="0"/>
+            </a:endParaRPr>
+          </a:p>
+          <a:p>
+            <a:pPr lvl="1"/>
+            <a:r>
+              <a:rPr lang="de-DE" dirty="0" err="1">
+                <a:latin typeface="Palatino Linotype" panose="02040502050505030304" pitchFamily="18" charset="0"/>
+              </a:rPr>
+              <a:t>Decoy</a:t>
+            </a:r>
+            <a:r>
+              <a:rPr lang="de-DE" dirty="0">
+                <a:latin typeface="Palatino Linotype" panose="02040502050505030304" pitchFamily="18" charset="0"/>
+              </a:rPr>
               <a:t> </a:t>
             </a:r>
             <a:r>
-              <a:rPr lang="de-DE" dirty="0" err="1"/>
-              <a:t>demand</a:t>
-            </a:r>
-            <a:r>
-              <a:rPr lang="de-DE" dirty="0"/>
+              <a:rPr lang="de-DE" dirty="0" err="1">
+                <a:latin typeface="Palatino Linotype" panose="02040502050505030304" pitchFamily="18" charset="0"/>
+              </a:rPr>
+              <a:t>Effect</a:t>
+            </a:r>
+            <a:endParaRPr lang="de-DE" dirty="0">
+              <a:latin typeface="Palatino Linotype" panose="02040502050505030304" pitchFamily="18" charset="0"/>
+            </a:endParaRPr>
+          </a:p>
+          <a:p>
+            <a:pPr lvl="1"/>
+            <a:r>
+              <a:rPr lang="de-DE" dirty="0" err="1">
+                <a:latin typeface="Palatino Linotype" panose="02040502050505030304" pitchFamily="18" charset="0"/>
+              </a:rPr>
+              <a:t>Sunk</a:t>
+            </a:r>
+            <a:r>
+              <a:rPr lang="de-DE" dirty="0">
+                <a:latin typeface="Palatino Linotype" panose="02040502050505030304" pitchFamily="18" charset="0"/>
+              </a:rPr>
               <a:t> </a:t>
             </a:r>
             <a:r>
-              <a:rPr lang="de-DE" dirty="0" err="1"/>
-              <a:t>curve</a:t>
-            </a:r>
-            <a:endParaRPr lang="de-DE" dirty="0"/>
-          </a:p>
-          <a:p>
-            <a:r>
-              <a:rPr lang="de-DE" dirty="0" err="1"/>
-              <a:t>Estimated</a:t>
-            </a:r>
-            <a:r>
-              <a:rPr lang="de-DE" dirty="0"/>
-              <a:t> WTP </a:t>
-            </a:r>
-            <a:r>
-              <a:rPr lang="de-DE" dirty="0" err="1"/>
-              <a:t>for</a:t>
-            </a:r>
-            <a:r>
-              <a:rPr lang="de-DE" dirty="0"/>
+              <a:rPr lang="de-DE" dirty="0" err="1">
+                <a:latin typeface="Palatino Linotype" panose="02040502050505030304" pitchFamily="18" charset="0"/>
+              </a:rPr>
+              <a:t>cost</a:t>
+            </a:r>
+            <a:r>
+              <a:rPr lang="de-DE" dirty="0">
+                <a:latin typeface="Palatino Linotype" panose="02040502050505030304" pitchFamily="18" charset="0"/>
+              </a:rPr>
               <a:t> </a:t>
             </a:r>
             <a:r>
-              <a:rPr lang="de-DE" dirty="0" err="1"/>
-              <a:t>products</a:t>
-            </a:r>
-            <a:r>
-              <a:rPr lang="de-DE" dirty="0"/>
-              <a:t> and </a:t>
-            </a:r>
-            <a:r>
-              <a:rPr lang="de-DE" dirty="0" err="1"/>
-              <a:t>features</a:t>
-            </a:r>
-            <a:r>
-              <a:rPr lang="de-DE" dirty="0"/>
-              <a:t> </a:t>
-            </a:r>
-            <a:r>
-              <a:rPr lang="de-DE" dirty="0" err="1"/>
-              <a:t>of</a:t>
-            </a:r>
-            <a:r>
-              <a:rPr lang="de-DE" dirty="0"/>
-              <a:t> </a:t>
-            </a:r>
-            <a:r>
-              <a:rPr lang="de-DE" dirty="0" err="1"/>
-              <a:t>realistic</a:t>
-            </a:r>
-            <a:r>
-              <a:rPr lang="de-DE" dirty="0"/>
-              <a:t> </a:t>
-            </a:r>
-            <a:r>
-              <a:rPr lang="de-DE" dirty="0" err="1"/>
-              <a:t>magnitude</a:t>
-            </a:r>
-            <a:endParaRPr lang="de-DE" dirty="0"/>
-          </a:p>
-          <a:p>
-            <a:r>
-              <a:rPr lang="de-DE" dirty="0"/>
-              <a:t>Also: State-</a:t>
-            </a:r>
-            <a:r>
-              <a:rPr lang="de-DE" dirty="0" err="1"/>
-              <a:t>dependence</a:t>
-            </a:r>
-            <a:r>
-              <a:rPr lang="de-DE" dirty="0"/>
-              <a:t> and human-like </a:t>
-            </a:r>
-            <a:r>
-              <a:rPr lang="de-DE" dirty="0" err="1"/>
-              <a:t>order</a:t>
-            </a:r>
-            <a:r>
-              <a:rPr lang="de-DE" dirty="0"/>
-              <a:t> </a:t>
-            </a:r>
-            <a:r>
-              <a:rPr lang="de-DE" dirty="0" err="1"/>
-              <a:t>bias</a:t>
-            </a:r>
-            <a:r>
-              <a:rPr lang="de-DE" dirty="0"/>
-              <a:t> </a:t>
-            </a:r>
-          </a:p>
-          <a:p>
-            <a:r>
-              <a:rPr lang="de-DE" dirty="0"/>
-              <a:t>Dominguez-</a:t>
-            </a:r>
-            <a:r>
-              <a:rPr lang="de-DE" dirty="0" err="1"/>
-              <a:t>Olmedo</a:t>
-            </a:r>
-            <a:r>
-              <a:rPr lang="de-DE" dirty="0"/>
-              <a:t> et al. (10/2023) </a:t>
-            </a:r>
-            <a:r>
-              <a:rPr lang="de-DE" dirty="0" err="1"/>
-              <a:t>focus</a:t>
-            </a:r>
-            <a:r>
-              <a:rPr lang="de-DE" dirty="0"/>
-              <a:t> on </a:t>
-            </a:r>
-            <a:r>
-              <a:rPr lang="de-DE" dirty="0" err="1"/>
-              <a:t>survey</a:t>
-            </a:r>
-            <a:r>
-              <a:rPr lang="de-DE" dirty="0"/>
-              <a:t>-like </a:t>
-            </a:r>
-            <a:r>
-              <a:rPr lang="de-DE" dirty="0" err="1"/>
-              <a:t>requests</a:t>
-            </a:r>
-            <a:r>
-              <a:rPr lang="de-DE" dirty="0"/>
-              <a:t>:</a:t>
-            </a:r>
-          </a:p>
-          <a:p>
-            <a:r>
-              <a:rPr lang="de-DE" dirty="0"/>
-              <a:t>Models </a:t>
-            </a:r>
-            <a:r>
-              <a:rPr lang="de-DE" dirty="0" err="1"/>
-              <a:t>exhibit</a:t>
-            </a:r>
-            <a:r>
-              <a:rPr lang="de-DE" dirty="0"/>
-              <a:t> </a:t>
-            </a:r>
-            <a:r>
-              <a:rPr lang="de-DE" dirty="0" err="1"/>
-              <a:t>considerable</a:t>
-            </a:r>
-            <a:r>
-              <a:rPr lang="de-DE" dirty="0"/>
-              <a:t> </a:t>
-            </a:r>
-            <a:r>
-              <a:rPr lang="de-DE" dirty="0" err="1"/>
-              <a:t>position</a:t>
-            </a:r>
-            <a:r>
-              <a:rPr lang="de-DE" dirty="0"/>
-              <a:t> and </a:t>
-            </a:r>
-            <a:r>
-              <a:rPr lang="de-DE" dirty="0" err="1"/>
-              <a:t>labeling</a:t>
-            </a:r>
-            <a:r>
-              <a:rPr lang="de-DE" dirty="0"/>
-              <a:t> </a:t>
-            </a:r>
-            <a:r>
-              <a:rPr lang="de-DE" dirty="0" err="1"/>
-              <a:t>biases</a:t>
-            </a:r>
-            <a:endParaRPr lang="de-DE" dirty="0"/>
-          </a:p>
-          <a:p>
-            <a:r>
-              <a:rPr lang="de-DE" dirty="0" err="1"/>
-              <a:t>Once</a:t>
-            </a:r>
-            <a:r>
-              <a:rPr lang="de-DE" dirty="0"/>
-              <a:t> </a:t>
-            </a:r>
-            <a:r>
-              <a:rPr lang="de-DE" dirty="0" err="1"/>
-              <a:t>corrected</a:t>
-            </a:r>
-            <a:r>
-              <a:rPr lang="de-DE" dirty="0"/>
-              <a:t> </a:t>
-            </a:r>
-            <a:r>
-              <a:rPr lang="de-DE" dirty="0" err="1"/>
-              <a:t>for</a:t>
-            </a:r>
-            <a:r>
-              <a:rPr lang="de-DE" dirty="0"/>
-              <a:t> </a:t>
-            </a:r>
-            <a:r>
-              <a:rPr lang="de-DE" dirty="0" err="1"/>
-              <a:t>this</a:t>
-            </a:r>
-            <a:r>
-              <a:rPr lang="de-DE" dirty="0"/>
-              <a:t>, </a:t>
-            </a:r>
-            <a:r>
-              <a:rPr lang="de-DE" dirty="0" err="1"/>
-              <a:t>responses</a:t>
-            </a:r>
-            <a:r>
-              <a:rPr lang="de-DE" dirty="0"/>
-              <a:t> </a:t>
-            </a:r>
-            <a:r>
-              <a:rPr lang="de-DE" dirty="0" err="1"/>
-              <a:t>trend</a:t>
-            </a:r>
-            <a:r>
-              <a:rPr lang="de-DE" dirty="0"/>
-              <a:t> to uniform </a:t>
-            </a:r>
-            <a:r>
-              <a:rPr lang="de-DE" dirty="0" err="1"/>
-              <a:t>distribution</a:t>
-            </a:r>
-            <a:endParaRPr lang="de-DE" dirty="0"/>
+              <a:rPr lang="de-DE" dirty="0" err="1">
+                <a:latin typeface="Palatino Linotype" panose="02040502050505030304" pitchFamily="18" charset="0"/>
+              </a:rPr>
+              <a:t>fallacy</a:t>
+            </a:r>
+            <a:endParaRPr lang="de-DE" dirty="0">
+              <a:latin typeface="Palatino Linotype" panose="02040502050505030304" pitchFamily="18" charset="0"/>
+            </a:endParaRPr>
           </a:p>
           <a:p>
             <a:pPr lvl="1"/>
             <a:r>
-              <a:rPr lang="de-DE" dirty="0"/>
-              <a:t>Binary </a:t>
-            </a:r>
-            <a:r>
-              <a:rPr lang="de-DE" dirty="0" err="1"/>
-              <a:t>classifiers</a:t>
-            </a:r>
-            <a:r>
-              <a:rPr lang="de-DE" dirty="0"/>
-              <a:t> </a:t>
-            </a:r>
-            <a:r>
-              <a:rPr lang="de-DE" dirty="0" err="1"/>
-              <a:t>could</a:t>
-            </a:r>
-            <a:r>
-              <a:rPr lang="de-DE" dirty="0"/>
-              <a:t> </a:t>
-            </a:r>
-            <a:r>
-              <a:rPr lang="de-DE" dirty="0" err="1"/>
-              <a:t>almost</a:t>
-            </a:r>
-            <a:r>
-              <a:rPr lang="de-DE" dirty="0"/>
-              <a:t> </a:t>
-            </a:r>
-            <a:r>
-              <a:rPr lang="de-DE" dirty="0" err="1"/>
-              <a:t>always</a:t>
-            </a:r>
-            <a:r>
-              <a:rPr lang="de-DE" dirty="0"/>
-              <a:t> </a:t>
-            </a:r>
-            <a:r>
-              <a:rPr lang="de-DE" dirty="0" err="1"/>
-              <a:t>distinguish</a:t>
-            </a:r>
-            <a:r>
-              <a:rPr lang="de-DE" dirty="0"/>
-              <a:t> </a:t>
-            </a:r>
-            <a:r>
-              <a:rPr lang="de-DE" dirty="0" err="1"/>
-              <a:t>between</a:t>
-            </a:r>
-            <a:r>
-              <a:rPr lang="de-DE" dirty="0"/>
-              <a:t> a </a:t>
-            </a:r>
-            <a:r>
-              <a:rPr lang="de-DE" dirty="0" err="1"/>
-              <a:t>model‘s</a:t>
-            </a:r>
-            <a:r>
-              <a:rPr lang="de-DE" dirty="0"/>
-              <a:t> and real </a:t>
-            </a:r>
-            <a:r>
-              <a:rPr lang="de-DE" dirty="0" err="1"/>
-              <a:t>responses</a:t>
-            </a:r>
-            <a:r>
-              <a:rPr lang="de-DE" dirty="0"/>
-              <a:t> to </a:t>
-            </a:r>
-            <a:r>
-              <a:rPr lang="de-DE" dirty="0" err="1"/>
-              <a:t>the</a:t>
-            </a:r>
-            <a:r>
-              <a:rPr lang="de-DE" dirty="0"/>
-              <a:t> ACS (American Community Survey)</a:t>
-            </a:r>
-          </a:p>
-          <a:p>
-            <a:pPr marL="0" indent="0">
-              <a:buNone/>
-            </a:pPr>
-            <a:endParaRPr lang="de-DE" dirty="0"/>
-          </a:p>
-        </p:txBody>
-      </p:sp>
-      <p:sp>
-        <p:nvSpPr>
-          <p:cNvPr id="4" name="Fußzeilenplatzhalter 3">
-            <a:extLst>
-              <a:ext uri="{FF2B5EF4-FFF2-40B4-BE49-F238E27FC236}">
-                <a16:creationId xmlns:a16="http://schemas.microsoft.com/office/drawing/2014/main" id="{6AA01806-E4A3-60D9-6DDF-F4BB2433BB26}"/>
-              </a:ext>
-            </a:extLst>
-          </p:cNvPr>
-          <p:cNvSpPr>
-            <a:spLocks noGrp="1"/>
-          </p:cNvSpPr>
-          <p:nvPr>
-            <p:ph type="ftr" sz="quarter" idx="11"/>
-          </p:nvPr>
-        </p:nvSpPr>
-        <p:spPr>
-          <a:xfrm>
-            <a:off x="0" y="6474620"/>
-            <a:ext cx="12192000" cy="365125"/>
-          </a:xfrm>
-        </p:spPr>
-        <p:txBody>
-          <a:bodyPr/>
-          <a:lstStyle/>
-          <a:p>
-            <a:pPr algn="l"/>
-            <a:r>
-              <a:rPr lang="en-US" i="1" dirty="0"/>
-              <a:t>Dominguez-Olmedo, R., Hardt, M., &amp; </a:t>
-            </a:r>
-            <a:r>
-              <a:rPr lang="en-US" i="1" dirty="0" err="1"/>
-              <a:t>Mendler</a:t>
-            </a:r>
-            <a:r>
-              <a:rPr lang="en-US" i="1" dirty="0"/>
-              <a:t>-Dunner, C. (2023). Questioning the Survey Responses of Large Language Models. </a:t>
-            </a:r>
-            <a:r>
-              <a:rPr lang="en-US" i="1" dirty="0" err="1"/>
-              <a:t>ArXiv</a:t>
-            </a:r>
-            <a:r>
-              <a:rPr lang="en-US" i="1" dirty="0"/>
-              <a:t>, abs/2306.07951.</a:t>
-            </a:r>
-            <a:endParaRPr lang="en-US" dirty="0"/>
-          </a:p>
-          <a:p>
-            <a:pPr algn="l"/>
-            <a:r>
-              <a:rPr lang="en-US" dirty="0"/>
-              <a:t>Brand, James and Israeli, Ayelet and Ngwe, Donald, Using GPT for Market Research (March 21, 2023). Harvard Business School Marketing Unit Working Paper No. 23-062</a:t>
-            </a:r>
-          </a:p>
-        </p:txBody>
-      </p:sp>
-    </p:spTree>
-    <p:extLst>
-      <p:ext uri="{BB962C8B-B14F-4D97-AF65-F5344CB8AC3E}">
-        <p14:creationId xmlns:p14="http://schemas.microsoft.com/office/powerpoint/2010/main" val="1274610509"/>
-      </p:ext>
-    </p:extLst>
-  </p:cSld>
-  <p:clrMapOvr>
-    <a:masterClrMapping/>
-  </p:clrMapOvr>
-</p:sld>
-</file>
-
-<file path=ppt/slides/slide5.xml><?xml version="1.0" encoding="utf-8"?>
-<p:sld xmlns:a="http://schemas.openxmlformats.org/drawingml/2006/main" xmlns:r="http://schemas.openxmlformats.org/officeDocument/2006/relationships" xmlns:p="http://schemas.openxmlformats.org/presentationml/2006/main">
-  <p:cSld>
-    <p:spTree>
-      <p:nvGrpSpPr>
-        <p:cNvPr id="1" name=""/>
-        <p:cNvGrpSpPr/>
-        <p:nvPr/>
-      </p:nvGrpSpPr>
-      <p:grpSpPr>
-        <a:xfrm>
-          <a:off x="0" y="0"/>
-          <a:ext cx="0" cy="0"/>
-          <a:chOff x="0" y="0"/>
-          <a:chExt cx="0" cy="0"/>
-        </a:xfrm>
-      </p:grpSpPr>
-      <p:sp>
-        <p:nvSpPr>
-          <p:cNvPr id="2" name="Titel 1">
-            <a:extLst>
-              <a:ext uri="{FF2B5EF4-FFF2-40B4-BE49-F238E27FC236}">
-                <a16:creationId xmlns:a16="http://schemas.microsoft.com/office/drawing/2014/main" id="{ACDE1556-20ED-1289-2C1E-B46CF7287C22}"/>
-              </a:ext>
-            </a:extLst>
-          </p:cNvPr>
-          <p:cNvSpPr>
-            <a:spLocks noGrp="1"/>
-          </p:cNvSpPr>
-          <p:nvPr>
-            <p:ph type="title"/>
-          </p:nvPr>
-        </p:nvSpPr>
-        <p:spPr>
-          <a:xfrm>
-            <a:off x="838200" y="18255"/>
-            <a:ext cx="10515600" cy="1325563"/>
-          </a:xfrm>
-        </p:spPr>
-        <p:txBody>
-          <a:bodyPr>
-            <a:normAutofit/>
-          </a:bodyPr>
-          <a:lstStyle/>
-          <a:p>
-            <a:r>
-              <a:rPr lang="de-DE" sz="3600" dirty="0" err="1"/>
-              <a:t>Our</a:t>
-            </a:r>
-            <a:r>
-              <a:rPr lang="de-DE" sz="3600" dirty="0"/>
-              <a:t> </a:t>
-            </a:r>
-            <a:r>
-              <a:rPr lang="de-DE" sz="3600" dirty="0" err="1"/>
-              <a:t>research</a:t>
-            </a:r>
-            <a:r>
-              <a:rPr lang="de-DE" sz="3600" dirty="0"/>
-              <a:t> </a:t>
-            </a:r>
-            <a:r>
-              <a:rPr lang="de-DE" sz="3600" dirty="0" err="1"/>
-              <a:t>approach</a:t>
-            </a:r>
-            <a:endParaRPr lang="en-US" sz="3600" dirty="0"/>
-          </a:p>
-        </p:txBody>
-      </p:sp>
-      <p:sp>
-        <p:nvSpPr>
-          <p:cNvPr id="3" name="Inhaltsplatzhalter 2">
-            <a:extLst>
-              <a:ext uri="{FF2B5EF4-FFF2-40B4-BE49-F238E27FC236}">
-                <a16:creationId xmlns:a16="http://schemas.microsoft.com/office/drawing/2014/main" id="{A55AD18F-785E-E109-A2DC-BEA7782CD98A}"/>
-              </a:ext>
-            </a:extLst>
-          </p:cNvPr>
-          <p:cNvSpPr>
-            <a:spLocks noGrp="1"/>
-          </p:cNvSpPr>
-          <p:nvPr>
-            <p:ph idx="1"/>
-          </p:nvPr>
-        </p:nvSpPr>
-        <p:spPr>
-          <a:xfrm>
-            <a:off x="838200" y="1343818"/>
-            <a:ext cx="10515600" cy="4351338"/>
-          </a:xfrm>
-        </p:spPr>
-        <p:txBody>
-          <a:bodyPr>
-            <a:normAutofit lnSpcReduction="10000"/>
-          </a:bodyPr>
-          <a:lstStyle/>
-          <a:p>
-            <a:r>
-              <a:rPr lang="de-DE" dirty="0" err="1"/>
-              <a:t>Three</a:t>
-            </a:r>
-            <a:r>
-              <a:rPr lang="de-DE" dirty="0"/>
-              <a:t> </a:t>
-            </a:r>
-            <a:r>
-              <a:rPr lang="de-DE" dirty="0" err="1"/>
-              <a:t>models</a:t>
-            </a:r>
-            <a:r>
-              <a:rPr lang="de-DE" dirty="0"/>
-              <a:t>: </a:t>
-            </a:r>
-            <a:r>
-              <a:rPr lang="de-DE" dirty="0" err="1"/>
-              <a:t>Openai‘s</a:t>
-            </a:r>
-            <a:r>
-              <a:rPr lang="de-DE" dirty="0"/>
-              <a:t> GPT-3 &amp; GPT-4, </a:t>
-            </a:r>
-            <a:r>
-              <a:rPr lang="de-DE" dirty="0" err="1"/>
-              <a:t>Meta‘s</a:t>
-            </a:r>
-            <a:r>
-              <a:rPr lang="de-DE" dirty="0"/>
-              <a:t> Llama-2-70b</a:t>
-            </a:r>
-          </a:p>
-          <a:p>
-            <a:r>
-              <a:rPr lang="de-DE" dirty="0"/>
-              <a:t>Access </a:t>
-            </a:r>
-            <a:r>
-              <a:rPr lang="de-DE" dirty="0" err="1"/>
-              <a:t>through</a:t>
-            </a:r>
-            <a:r>
-              <a:rPr lang="de-DE" dirty="0"/>
-              <a:t> API and </a:t>
-            </a:r>
-            <a:r>
-              <a:rPr lang="de-DE" dirty="0" err="1"/>
-              <a:t>issue</a:t>
-            </a:r>
-            <a:r>
-              <a:rPr lang="de-DE" dirty="0"/>
-              <a:t> </a:t>
-            </a:r>
-            <a:r>
-              <a:rPr lang="de-DE" dirty="0" err="1"/>
-              <a:t>thousands</a:t>
-            </a:r>
-            <a:r>
-              <a:rPr lang="de-DE" dirty="0"/>
-              <a:t> </a:t>
-            </a:r>
-            <a:r>
-              <a:rPr lang="de-DE" dirty="0" err="1"/>
-              <a:t>of</a:t>
-            </a:r>
-            <a:r>
-              <a:rPr lang="de-DE" dirty="0"/>
-              <a:t> </a:t>
-            </a:r>
-            <a:r>
-              <a:rPr lang="de-DE" dirty="0" err="1"/>
-              <a:t>requests</a:t>
-            </a:r>
-            <a:endParaRPr lang="de-DE" dirty="0"/>
-          </a:p>
-          <a:p>
-            <a:r>
-              <a:rPr lang="de-DE" dirty="0"/>
-              <a:t>Special </a:t>
-            </a:r>
-            <a:r>
-              <a:rPr lang="de-DE" dirty="0" err="1"/>
-              <a:t>focus</a:t>
-            </a:r>
-            <a:r>
-              <a:rPr lang="de-DE" dirty="0"/>
-              <a:t> on „</a:t>
-            </a:r>
-            <a:r>
-              <a:rPr lang="de-DE" dirty="0" err="1"/>
-              <a:t>temperature</a:t>
-            </a:r>
-            <a:r>
-              <a:rPr lang="de-DE" dirty="0"/>
-              <a:t>“-parameter </a:t>
-            </a:r>
+              <a:rPr lang="de-DE" dirty="0">
+                <a:latin typeface="Palatino Linotype" panose="02040502050505030304" pitchFamily="18" charset="0"/>
+              </a:rPr>
+              <a:t>Loss </a:t>
+            </a:r>
+            <a:r>
+              <a:rPr lang="de-DE" dirty="0" err="1">
+                <a:latin typeface="Palatino Linotype" panose="02040502050505030304" pitchFamily="18" charset="0"/>
+              </a:rPr>
+              <a:t>aversion</a:t>
+            </a:r>
+            <a:endParaRPr lang="de-DE" dirty="0">
+              <a:latin typeface="Palatino Linotype" panose="02040502050505030304" pitchFamily="18" charset="0"/>
+            </a:endParaRPr>
           </a:p>
           <a:p>
             <a:pPr lvl="1"/>
             <a:r>
-              <a:rPr lang="de-DE" dirty="0" err="1"/>
-              <a:t>Probability</a:t>
-            </a:r>
-            <a:r>
-              <a:rPr lang="de-DE" dirty="0"/>
-              <a:t> </a:t>
-            </a:r>
-            <a:r>
-              <a:rPr lang="de-DE" dirty="0" err="1"/>
-              <a:t>of</a:t>
-            </a:r>
-            <a:r>
-              <a:rPr lang="de-DE" dirty="0"/>
-              <a:t> </a:t>
-            </a:r>
-            <a:r>
-              <a:rPr lang="de-DE" dirty="0" err="1"/>
-              <a:t>choosing</a:t>
-            </a:r>
-            <a:r>
-              <a:rPr lang="de-DE" dirty="0"/>
-              <a:t> a </a:t>
-            </a:r>
-            <a:r>
-              <a:rPr lang="de-DE" dirty="0" err="1"/>
-              <a:t>less</a:t>
-            </a:r>
-            <a:r>
-              <a:rPr lang="de-DE" dirty="0"/>
-              <a:t> </a:t>
-            </a:r>
-            <a:r>
-              <a:rPr lang="de-DE" dirty="0" err="1"/>
-              <a:t>likely</a:t>
-            </a:r>
-            <a:r>
-              <a:rPr lang="de-DE" dirty="0"/>
-              <a:t> </a:t>
-            </a:r>
-            <a:r>
-              <a:rPr lang="de-DE" dirty="0" err="1"/>
-              <a:t>token</a:t>
-            </a:r>
-            <a:r>
-              <a:rPr lang="de-DE" dirty="0"/>
-              <a:t> </a:t>
-            </a:r>
-          </a:p>
-          <a:p>
-            <a:pPr lvl="1"/>
-            <a:r>
-              <a:rPr lang="de-DE" dirty="0"/>
-              <a:t>0 </a:t>
-            </a:r>
-            <a:r>
-              <a:rPr lang="de-DE" dirty="0" err="1"/>
-              <a:t>for</a:t>
-            </a:r>
-            <a:r>
-              <a:rPr lang="de-DE" dirty="0"/>
-              <a:t> </a:t>
-            </a:r>
-            <a:r>
-              <a:rPr lang="de-DE" dirty="0" err="1"/>
-              <a:t>deterministic</a:t>
-            </a:r>
-            <a:r>
-              <a:rPr lang="de-DE" dirty="0"/>
-              <a:t> </a:t>
-            </a:r>
-            <a:r>
-              <a:rPr lang="de-DE" dirty="0" err="1"/>
-              <a:t>outcome</a:t>
-            </a:r>
-            <a:r>
-              <a:rPr lang="de-DE" dirty="0"/>
-              <a:t>, </a:t>
-            </a:r>
-            <a:r>
-              <a:rPr lang="de-DE" dirty="0" err="1"/>
-              <a:t>higher</a:t>
-            </a:r>
-            <a:r>
-              <a:rPr lang="de-DE" dirty="0"/>
-              <a:t> values </a:t>
-            </a:r>
-            <a:r>
-              <a:rPr lang="de-DE" dirty="0" err="1"/>
-              <a:t>induce</a:t>
-            </a:r>
-            <a:r>
-              <a:rPr lang="de-DE" dirty="0"/>
-              <a:t> </a:t>
-            </a:r>
-            <a:r>
-              <a:rPr lang="de-DE" dirty="0" err="1"/>
-              <a:t>randomness</a:t>
-            </a:r>
-            <a:r>
-              <a:rPr lang="de-DE" dirty="0"/>
-              <a:t> in </a:t>
-            </a:r>
-            <a:r>
-              <a:rPr lang="de-DE" dirty="0" err="1"/>
-              <a:t>response</a:t>
-            </a:r>
-            <a:endParaRPr lang="de-DE" dirty="0"/>
-          </a:p>
-          <a:p>
-            <a:r>
-              <a:rPr lang="de-DE" dirty="0" err="1"/>
-              <a:t>Recreating</a:t>
-            </a:r>
-            <a:r>
-              <a:rPr lang="de-DE" dirty="0"/>
-              <a:t> </a:t>
-            </a:r>
-            <a:r>
-              <a:rPr lang="de-DE" dirty="0" err="1"/>
-              <a:t>typical</a:t>
-            </a:r>
-            <a:r>
-              <a:rPr lang="de-DE" dirty="0"/>
-              <a:t> </a:t>
-            </a:r>
-            <a:r>
-              <a:rPr lang="de-DE" dirty="0" err="1"/>
-              <a:t>consumer</a:t>
-            </a:r>
-            <a:r>
-              <a:rPr lang="de-DE" dirty="0"/>
-              <a:t> </a:t>
-            </a:r>
-            <a:r>
-              <a:rPr lang="de-DE" dirty="0" err="1"/>
-              <a:t>behavior</a:t>
-            </a:r>
-            <a:r>
-              <a:rPr lang="de-DE" dirty="0"/>
-              <a:t> </a:t>
-            </a:r>
-            <a:r>
-              <a:rPr lang="de-DE" dirty="0" err="1"/>
-              <a:t>patterns</a:t>
-            </a:r>
-            <a:r>
-              <a:rPr lang="de-DE" dirty="0"/>
-              <a:t> via:</a:t>
-            </a:r>
-          </a:p>
-          <a:p>
-            <a:pPr lvl="1"/>
-            <a:r>
-              <a:rPr lang="de-DE" dirty="0"/>
-              <a:t>Prospect </a:t>
-            </a:r>
-            <a:r>
-              <a:rPr lang="de-DE" dirty="0" err="1"/>
-              <a:t>theory</a:t>
-            </a:r>
-            <a:endParaRPr lang="de-DE" dirty="0"/>
-          </a:p>
-          <a:p>
-            <a:pPr lvl="1"/>
-            <a:r>
-              <a:rPr lang="de-DE" dirty="0" err="1"/>
-              <a:t>Decoy</a:t>
-            </a:r>
-            <a:r>
-              <a:rPr lang="de-DE" dirty="0"/>
-              <a:t> </a:t>
-            </a:r>
-            <a:r>
-              <a:rPr lang="de-DE" dirty="0" err="1"/>
-              <a:t>Effect</a:t>
-            </a:r>
-            <a:endParaRPr lang="de-DE" dirty="0"/>
-          </a:p>
-          <a:p>
-            <a:pPr lvl="1"/>
-            <a:r>
-              <a:rPr lang="de-DE" dirty="0" err="1"/>
-              <a:t>Sunk</a:t>
-            </a:r>
-            <a:r>
-              <a:rPr lang="de-DE" dirty="0"/>
-              <a:t> </a:t>
-            </a:r>
-            <a:r>
-              <a:rPr lang="de-DE" dirty="0" err="1"/>
-              <a:t>cost</a:t>
-            </a:r>
-            <a:r>
-              <a:rPr lang="de-DE" dirty="0"/>
-              <a:t> </a:t>
-            </a:r>
-            <a:r>
-              <a:rPr lang="de-DE" dirty="0" err="1"/>
-              <a:t>fallacy</a:t>
-            </a:r>
-            <a:endParaRPr lang="de-DE" dirty="0"/>
-          </a:p>
-          <a:p>
-            <a:pPr lvl="1"/>
-            <a:r>
-              <a:rPr lang="de-DE" dirty="0"/>
-              <a:t>Loss </a:t>
-            </a:r>
-            <a:r>
-              <a:rPr lang="de-DE" dirty="0" err="1"/>
-              <a:t>aversion</a:t>
-            </a:r>
-            <a:endParaRPr lang="de-DE" dirty="0"/>
-          </a:p>
-          <a:p>
-            <a:pPr lvl="1"/>
-            <a:r>
-              <a:rPr lang="de-DE" dirty="0"/>
+              <a:rPr lang="de-DE" dirty="0">
+                <a:latin typeface="Palatino Linotype" panose="02040502050505030304" pitchFamily="18" charset="0"/>
+              </a:rPr>
               <a:t>Ultimatum Game</a:t>
             </a:r>
           </a:p>
@@ -6086,10 +6251,14 @@
             <a:pPr marL="457200" lvl="1" indent="0">
               <a:buNone/>
             </a:pPr>
-            <a:endParaRPr lang="de-DE" dirty="0"/>
-          </a:p>
-          <a:p>
-            <a:endParaRPr lang="en-US" dirty="0"/>
+            <a:endParaRPr lang="de-DE" dirty="0">
+              <a:latin typeface="Palatino Linotype" panose="02040502050505030304" pitchFamily="18" charset="0"/>
+            </a:endParaRPr>
+          </a:p>
+          <a:p>
+            <a:endParaRPr lang="en-US" dirty="0">
+              <a:latin typeface="Palatino Linotype" panose="02040502050505030304" pitchFamily="18" charset="0"/>
+            </a:endParaRPr>
           </a:p>
         </p:txBody>
       </p:sp>

</xml_diff>